<commit_message>
nav bar kind of up ? plus fancy background ?
</commit_message>
<xml_diff>
--- a/media/MUX.pptx
+++ b/media/MUX.pptx
@@ -6,6 +6,8 @@
   </p:sldMasterIdLst>
   <p:sldIdLst>
     <p:sldId id="256" r:id="rId2"/>
+    <p:sldId id="258" r:id="rId3"/>
+    <p:sldId id="257" r:id="rId4"/>
   </p:sldIdLst>
   <p:sldSz cx="12192000" cy="6858000"/>
   <p:notesSz cx="6858000" cy="9144000"/>
@@ -3817,6 +3819,902 @@
 </p:sld>
 </file>
 
+<file path=ppt/slides/slide2.xml><?xml version="1.0" encoding="utf-8"?>
+<p:sld xmlns:a="http://schemas.openxmlformats.org/drawingml/2006/main" xmlns:r="http://schemas.openxmlformats.org/officeDocument/2006/relationships" xmlns:p="http://schemas.openxmlformats.org/presentationml/2006/main">
+  <p:cSld>
+    <p:spTree>
+      <p:nvGrpSpPr>
+        <p:cNvPr id="1" name="">
+          <a:extLst>
+            <a:ext uri="{FF2B5EF4-FFF2-40B4-BE49-F238E27FC236}">
+              <a16:creationId xmlns:a16="http://schemas.microsoft.com/office/drawing/2014/main" id="{8E7E5252-018C-B88D-3A76-0233495D88D9}"/>
+            </a:ext>
+          </a:extLst>
+        </p:cNvPr>
+        <p:cNvGrpSpPr/>
+        <p:nvPr/>
+      </p:nvGrpSpPr>
+      <p:grpSpPr>
+        <a:xfrm>
+          <a:off x="0" y="0"/>
+          <a:ext cx="0" cy="0"/>
+          <a:chOff x="0" y="0"/>
+          <a:chExt cx="0" cy="0"/>
+        </a:xfrm>
+      </p:grpSpPr>
+      <p:sp>
+        <p:nvSpPr>
+          <p:cNvPr id="3" name="Rectangle 2">
+            <a:extLst>
+              <a:ext uri="{FF2B5EF4-FFF2-40B4-BE49-F238E27FC236}">
+                <a16:creationId xmlns:a16="http://schemas.microsoft.com/office/drawing/2014/main" id="{319377DC-BED3-3C28-D41F-3120620AFD03}"/>
+              </a:ext>
+            </a:extLst>
+          </p:cNvPr>
+          <p:cNvSpPr/>
+          <p:nvPr/>
+        </p:nvSpPr>
+        <p:spPr>
+          <a:xfrm>
+            <a:off x="1323975" y="276225"/>
+            <a:ext cx="9934575" cy="6248400"/>
+          </a:xfrm>
+          <a:prstGeom prst="rect">
+            <a:avLst/>
+          </a:prstGeom>
+        </p:spPr>
+        <p:style>
+          <a:lnRef idx="2">
+            <a:schemeClr val="accent1">
+              <a:shade val="15000"/>
+            </a:schemeClr>
+          </a:lnRef>
+          <a:fillRef idx="1">
+            <a:schemeClr val="accent1"/>
+          </a:fillRef>
+          <a:effectRef idx="0">
+            <a:schemeClr val="accent1"/>
+          </a:effectRef>
+          <a:fontRef idx="minor">
+            <a:schemeClr val="lt1"/>
+          </a:fontRef>
+        </p:style>
+        <p:txBody>
+          <a:bodyPr rtlCol="0" anchor="ctr"/>
+          <a:lstStyle/>
+          <a:p>
+            <a:pPr algn="ctr"/>
+            <a:endParaRPr lang="en-SG"/>
+          </a:p>
+        </p:txBody>
+      </p:sp>
+      <p:sp>
+        <p:nvSpPr>
+          <p:cNvPr id="4" name="Rectangle: Rounded Corners 3">
+            <a:extLst>
+              <a:ext uri="{FF2B5EF4-FFF2-40B4-BE49-F238E27FC236}">
+                <a16:creationId xmlns:a16="http://schemas.microsoft.com/office/drawing/2014/main" id="{C38A0E3C-C72D-3C42-93FC-43665E49DF1D}"/>
+              </a:ext>
+            </a:extLst>
+          </p:cNvPr>
+          <p:cNvSpPr/>
+          <p:nvPr/>
+        </p:nvSpPr>
+        <p:spPr>
+          <a:xfrm>
+            <a:off x="3396000" y="542924"/>
+            <a:ext cx="5400000" cy="5400000"/>
+          </a:xfrm>
+          <a:prstGeom prst="roundRect">
+            <a:avLst/>
+          </a:prstGeom>
+          <a:solidFill>
+            <a:schemeClr val="bg1"/>
+          </a:solidFill>
+          <a:ln w="12700">
+            <a:solidFill>
+              <a:schemeClr val="tx1"/>
+            </a:solidFill>
+          </a:ln>
+        </p:spPr>
+        <p:style>
+          <a:lnRef idx="2">
+            <a:schemeClr val="accent1">
+              <a:shade val="15000"/>
+            </a:schemeClr>
+          </a:lnRef>
+          <a:fillRef idx="1">
+            <a:schemeClr val="accent1"/>
+          </a:fillRef>
+          <a:effectRef idx="0">
+            <a:schemeClr val="accent1"/>
+          </a:effectRef>
+          <a:fontRef idx="minor">
+            <a:schemeClr val="lt1"/>
+          </a:fontRef>
+        </p:style>
+        <p:txBody>
+          <a:bodyPr rtlCol="0" anchor="ctr"/>
+          <a:lstStyle/>
+          <a:p>
+            <a:pPr algn="ctr"/>
+            <a:endParaRPr lang="en-SG"/>
+          </a:p>
+        </p:txBody>
+      </p:sp>
+      <p:sp>
+        <p:nvSpPr>
+          <p:cNvPr id="6" name="Diagonal Stripe 5">
+            <a:extLst>
+              <a:ext uri="{FF2B5EF4-FFF2-40B4-BE49-F238E27FC236}">
+                <a16:creationId xmlns:a16="http://schemas.microsoft.com/office/drawing/2014/main" id="{7038784F-41B6-508D-933D-9D4A3DF8A4A8}"/>
+              </a:ext>
+            </a:extLst>
+          </p:cNvPr>
+          <p:cNvSpPr/>
+          <p:nvPr/>
+        </p:nvSpPr>
+        <p:spPr>
+          <a:xfrm rot="8101733">
+            <a:off x="4066199" y="1337249"/>
+            <a:ext cx="3240000" cy="3240000"/>
+          </a:xfrm>
+          <a:prstGeom prst="diagStripe">
+            <a:avLst>
+              <a:gd name="adj" fmla="val 42332"/>
+            </a:avLst>
+          </a:prstGeom>
+          <a:solidFill>
+            <a:schemeClr val="accent6">
+              <a:lumMod val="40000"/>
+              <a:lumOff val="60000"/>
+            </a:schemeClr>
+          </a:solidFill>
+          <a:ln w="76200"/>
+        </p:spPr>
+        <p:style>
+          <a:lnRef idx="2">
+            <a:schemeClr val="accent1">
+              <a:shade val="15000"/>
+            </a:schemeClr>
+          </a:lnRef>
+          <a:fillRef idx="1">
+            <a:schemeClr val="accent1"/>
+          </a:fillRef>
+          <a:effectRef idx="0">
+            <a:schemeClr val="accent1"/>
+          </a:effectRef>
+          <a:fontRef idx="minor">
+            <a:schemeClr val="lt1"/>
+          </a:fontRef>
+        </p:style>
+        <p:txBody>
+          <a:bodyPr rtlCol="0" anchor="ctr"/>
+          <a:lstStyle/>
+          <a:p>
+            <a:pPr algn="ctr"/>
+            <a:endParaRPr lang="en-SG" dirty="0">
+              <a:solidFill>
+                <a:schemeClr val="tx1"/>
+              </a:solidFill>
+            </a:endParaRPr>
+          </a:p>
+        </p:txBody>
+      </p:sp>
+      <p:cxnSp>
+        <p:nvCxnSpPr>
+          <p:cNvPr id="8" name="Straight Connector 7">
+            <a:extLst>
+              <a:ext uri="{FF2B5EF4-FFF2-40B4-BE49-F238E27FC236}">
+                <a16:creationId xmlns:a16="http://schemas.microsoft.com/office/drawing/2014/main" id="{3943B20D-BCB4-DB18-A923-3F675D23C139}"/>
+              </a:ext>
+            </a:extLst>
+          </p:cNvPr>
+          <p:cNvCxnSpPr>
+            <a:cxnSpLocks/>
+          </p:cNvCxnSpPr>
+          <p:nvPr/>
+        </p:nvCxnSpPr>
+        <p:spPr>
+          <a:xfrm>
+            <a:off x="4429125" y="1504950"/>
+            <a:ext cx="1257075" cy="0"/>
+          </a:xfrm>
+          <a:prstGeom prst="line">
+            <a:avLst/>
+          </a:prstGeom>
+          <a:ln w="76200"/>
+        </p:spPr>
+        <p:style>
+          <a:lnRef idx="2">
+            <a:schemeClr val="dk1"/>
+          </a:lnRef>
+          <a:fillRef idx="0">
+            <a:schemeClr val="dk1"/>
+          </a:fillRef>
+          <a:effectRef idx="1">
+            <a:schemeClr val="dk1"/>
+          </a:effectRef>
+          <a:fontRef idx="minor">
+            <a:schemeClr val="tx1"/>
+          </a:fontRef>
+        </p:style>
+      </p:cxnSp>
+      <p:cxnSp>
+        <p:nvCxnSpPr>
+          <p:cNvPr id="11" name="Straight Connector 10">
+            <a:extLst>
+              <a:ext uri="{FF2B5EF4-FFF2-40B4-BE49-F238E27FC236}">
+                <a16:creationId xmlns:a16="http://schemas.microsoft.com/office/drawing/2014/main" id="{4760F940-BE62-7427-3FFE-D7128DCF5B46}"/>
+              </a:ext>
+            </a:extLst>
+          </p:cNvPr>
+          <p:cNvCxnSpPr>
+            <a:cxnSpLocks/>
+          </p:cNvCxnSpPr>
+          <p:nvPr/>
+        </p:nvCxnSpPr>
+        <p:spPr>
+          <a:xfrm>
+            <a:off x="4438650" y="2400300"/>
+            <a:ext cx="1276012" cy="0"/>
+          </a:xfrm>
+          <a:prstGeom prst="line">
+            <a:avLst/>
+          </a:prstGeom>
+          <a:ln w="76200"/>
+        </p:spPr>
+        <p:style>
+          <a:lnRef idx="2">
+            <a:schemeClr val="dk1"/>
+          </a:lnRef>
+          <a:fillRef idx="0">
+            <a:schemeClr val="dk1"/>
+          </a:fillRef>
+          <a:effectRef idx="1">
+            <a:schemeClr val="dk1"/>
+          </a:effectRef>
+          <a:fontRef idx="minor">
+            <a:schemeClr val="tx1"/>
+          </a:fontRef>
+        </p:style>
+      </p:cxnSp>
+      <p:cxnSp>
+        <p:nvCxnSpPr>
+          <p:cNvPr id="12" name="Straight Connector 11">
+            <a:extLst>
+              <a:ext uri="{FF2B5EF4-FFF2-40B4-BE49-F238E27FC236}">
+                <a16:creationId xmlns:a16="http://schemas.microsoft.com/office/drawing/2014/main" id="{4A18E8AD-3AC8-96C9-E51A-6354A811971E}"/>
+              </a:ext>
+            </a:extLst>
+          </p:cNvPr>
+          <p:cNvCxnSpPr>
+            <a:cxnSpLocks/>
+          </p:cNvCxnSpPr>
+          <p:nvPr/>
+        </p:nvCxnSpPr>
+        <p:spPr>
+          <a:xfrm>
+            <a:off x="4438650" y="3395399"/>
+            <a:ext cx="1276012" cy="0"/>
+          </a:xfrm>
+          <a:prstGeom prst="line">
+            <a:avLst/>
+          </a:prstGeom>
+          <a:ln w="76200"/>
+        </p:spPr>
+        <p:style>
+          <a:lnRef idx="2">
+            <a:schemeClr val="dk1"/>
+          </a:lnRef>
+          <a:fillRef idx="0">
+            <a:schemeClr val="dk1"/>
+          </a:fillRef>
+          <a:effectRef idx="1">
+            <a:schemeClr val="dk1"/>
+          </a:effectRef>
+          <a:fontRef idx="minor">
+            <a:schemeClr val="tx1"/>
+          </a:fontRef>
+        </p:style>
+      </p:cxnSp>
+      <p:cxnSp>
+        <p:nvCxnSpPr>
+          <p:cNvPr id="13" name="Straight Connector 12">
+            <a:extLst>
+              <a:ext uri="{FF2B5EF4-FFF2-40B4-BE49-F238E27FC236}">
+                <a16:creationId xmlns:a16="http://schemas.microsoft.com/office/drawing/2014/main" id="{25676BC9-D411-0327-47C8-4FD5C7AC6934}"/>
+              </a:ext>
+            </a:extLst>
+          </p:cNvPr>
+          <p:cNvCxnSpPr>
+            <a:cxnSpLocks/>
+          </p:cNvCxnSpPr>
+          <p:nvPr/>
+        </p:nvCxnSpPr>
+        <p:spPr>
+          <a:xfrm>
+            <a:off x="4429125" y="4400550"/>
+            <a:ext cx="1257075" cy="0"/>
+          </a:xfrm>
+          <a:prstGeom prst="line">
+            <a:avLst/>
+          </a:prstGeom>
+          <a:ln w="76200"/>
+        </p:spPr>
+        <p:style>
+          <a:lnRef idx="2">
+            <a:schemeClr val="dk1"/>
+          </a:lnRef>
+          <a:fillRef idx="0">
+            <a:schemeClr val="dk1"/>
+          </a:fillRef>
+          <a:effectRef idx="1">
+            <a:schemeClr val="dk1"/>
+          </a:effectRef>
+          <a:fontRef idx="minor">
+            <a:schemeClr val="tx1"/>
+          </a:fontRef>
+        </p:style>
+      </p:cxnSp>
+      <p:cxnSp>
+        <p:nvCxnSpPr>
+          <p:cNvPr id="14" name="Straight Connector 13">
+            <a:extLst>
+              <a:ext uri="{FF2B5EF4-FFF2-40B4-BE49-F238E27FC236}">
+                <a16:creationId xmlns:a16="http://schemas.microsoft.com/office/drawing/2014/main" id="{09582269-F14D-C05D-7971-B0DE55F71530}"/>
+              </a:ext>
+            </a:extLst>
+          </p:cNvPr>
+          <p:cNvCxnSpPr>
+            <a:cxnSpLocks/>
+          </p:cNvCxnSpPr>
+          <p:nvPr/>
+        </p:nvCxnSpPr>
+        <p:spPr>
+          <a:xfrm>
+            <a:off x="6115050" y="4819650"/>
+            <a:ext cx="0" cy="600075"/>
+          </a:xfrm>
+          <a:prstGeom prst="line">
+            <a:avLst/>
+          </a:prstGeom>
+          <a:ln w="76200"/>
+        </p:spPr>
+        <p:style>
+          <a:lnRef idx="2">
+            <a:schemeClr val="dk1"/>
+          </a:lnRef>
+          <a:fillRef idx="0">
+            <a:schemeClr val="dk1"/>
+          </a:fillRef>
+          <a:effectRef idx="1">
+            <a:schemeClr val="dk1"/>
+          </a:effectRef>
+          <a:fontRef idx="minor">
+            <a:schemeClr val="tx1"/>
+          </a:fontRef>
+        </p:style>
+      </p:cxnSp>
+      <p:cxnSp>
+        <p:nvCxnSpPr>
+          <p:cNvPr id="15" name="Straight Connector 14">
+            <a:extLst>
+              <a:ext uri="{FF2B5EF4-FFF2-40B4-BE49-F238E27FC236}">
+                <a16:creationId xmlns:a16="http://schemas.microsoft.com/office/drawing/2014/main" id="{9B4CDD71-8CEF-B591-E4B3-D3835DDFEE51}"/>
+              </a:ext>
+            </a:extLst>
+          </p:cNvPr>
+          <p:cNvCxnSpPr>
+            <a:cxnSpLocks/>
+          </p:cNvCxnSpPr>
+          <p:nvPr/>
+        </p:nvCxnSpPr>
+        <p:spPr>
+          <a:xfrm>
+            <a:off x="6686550" y="4267200"/>
+            <a:ext cx="0" cy="1152525"/>
+          </a:xfrm>
+          <a:prstGeom prst="line">
+            <a:avLst/>
+          </a:prstGeom>
+          <a:ln w="76200"/>
+        </p:spPr>
+        <p:style>
+          <a:lnRef idx="2">
+            <a:schemeClr val="dk1"/>
+          </a:lnRef>
+          <a:fillRef idx="0">
+            <a:schemeClr val="dk1"/>
+          </a:fillRef>
+          <a:effectRef idx="1">
+            <a:schemeClr val="dk1"/>
+          </a:effectRef>
+          <a:fontRef idx="minor">
+            <a:schemeClr val="tx1"/>
+          </a:fontRef>
+        </p:style>
+      </p:cxnSp>
+      <p:cxnSp>
+        <p:nvCxnSpPr>
+          <p:cNvPr id="19" name="Straight Arrow Connector 18">
+            <a:extLst>
+              <a:ext uri="{FF2B5EF4-FFF2-40B4-BE49-F238E27FC236}">
+                <a16:creationId xmlns:a16="http://schemas.microsoft.com/office/drawing/2014/main" id="{024ED374-1279-23F2-04A3-36868088C7F1}"/>
+              </a:ext>
+            </a:extLst>
+          </p:cNvPr>
+          <p:cNvCxnSpPr>
+            <a:cxnSpLocks/>
+            <a:stCxn id="6" idx="2"/>
+          </p:cNvCxnSpPr>
+          <p:nvPr/>
+        </p:nvCxnSpPr>
+        <p:spPr>
+          <a:xfrm>
+            <a:off x="7007388" y="2957915"/>
+            <a:ext cx="969837" cy="0"/>
+          </a:xfrm>
+          <a:prstGeom prst="straightConnector1">
+            <a:avLst/>
+          </a:prstGeom>
+          <a:ln w="76200">
+            <a:tailEnd type="triangle"/>
+          </a:ln>
+        </p:spPr>
+        <p:style>
+          <a:lnRef idx="2">
+            <a:schemeClr val="dk1"/>
+          </a:lnRef>
+          <a:fillRef idx="0">
+            <a:schemeClr val="dk1"/>
+          </a:fillRef>
+          <a:effectRef idx="1">
+            <a:schemeClr val="dk1"/>
+          </a:effectRef>
+          <a:fontRef idx="minor">
+            <a:schemeClr val="tx1"/>
+          </a:fontRef>
+        </p:style>
+      </p:cxnSp>
+      <p:sp>
+        <p:nvSpPr>
+          <p:cNvPr id="33" name="TextBox 32">
+            <a:extLst>
+              <a:ext uri="{FF2B5EF4-FFF2-40B4-BE49-F238E27FC236}">
+                <a16:creationId xmlns:a16="http://schemas.microsoft.com/office/drawing/2014/main" id="{A2C4D7B5-6A5A-7187-59F5-70D250791EEC}"/>
+              </a:ext>
+            </a:extLst>
+          </p:cNvPr>
+          <p:cNvSpPr txBox="1"/>
+          <p:nvPr/>
+        </p:nvSpPr>
+        <p:spPr>
+          <a:xfrm>
+            <a:off x="3886200" y="1247754"/>
+            <a:ext cx="552450" cy="523220"/>
+          </a:xfrm>
+          <a:prstGeom prst="rect">
+            <a:avLst/>
+          </a:prstGeom>
+          <a:noFill/>
+        </p:spPr>
+        <p:txBody>
+          <a:bodyPr wrap="square" rtlCol="0">
+            <a:spAutoFit/>
+          </a:bodyPr>
+          <a:lstStyle/>
+          <a:p>
+            <a:r>
+              <a:rPr lang="en-US" sz="2800" b="1" dirty="0">
+                <a:latin typeface="Times New Roman" panose="02020603050405020304" pitchFamily="18" charset="0"/>
+                <a:cs typeface="Times New Roman" panose="02020603050405020304" pitchFamily="18" charset="0"/>
+              </a:rPr>
+              <a:t>I</a:t>
+            </a:r>
+            <a:r>
+              <a:rPr lang="en-US" sz="2800" b="1" baseline="-25000" dirty="0">
+                <a:latin typeface="Times New Roman" panose="02020603050405020304" pitchFamily="18" charset="0"/>
+                <a:cs typeface="Times New Roman" panose="02020603050405020304" pitchFamily="18" charset="0"/>
+              </a:rPr>
+              <a:t>0</a:t>
+            </a:r>
+            <a:endParaRPr lang="en-SG" sz="2800" b="1" baseline="-25000" dirty="0">
+              <a:latin typeface="Times New Roman" panose="02020603050405020304" pitchFamily="18" charset="0"/>
+              <a:cs typeface="Times New Roman" panose="02020603050405020304" pitchFamily="18" charset="0"/>
+            </a:endParaRPr>
+          </a:p>
+        </p:txBody>
+      </p:sp>
+      <p:sp>
+        <p:nvSpPr>
+          <p:cNvPr id="34" name="TextBox 33">
+            <a:extLst>
+              <a:ext uri="{FF2B5EF4-FFF2-40B4-BE49-F238E27FC236}">
+                <a16:creationId xmlns:a16="http://schemas.microsoft.com/office/drawing/2014/main" id="{9C11863B-A120-CFFD-2748-4635B71D1062}"/>
+              </a:ext>
+            </a:extLst>
+          </p:cNvPr>
+          <p:cNvSpPr txBox="1"/>
+          <p:nvPr/>
+        </p:nvSpPr>
+        <p:spPr>
+          <a:xfrm>
+            <a:off x="3886200" y="2090895"/>
+            <a:ext cx="552450" cy="523220"/>
+          </a:xfrm>
+          <a:prstGeom prst="rect">
+            <a:avLst/>
+          </a:prstGeom>
+          <a:noFill/>
+        </p:spPr>
+        <p:txBody>
+          <a:bodyPr wrap="square" rtlCol="0">
+            <a:spAutoFit/>
+          </a:bodyPr>
+          <a:lstStyle/>
+          <a:p>
+            <a:r>
+              <a:rPr lang="en-US" sz="2800" b="1" dirty="0">
+                <a:latin typeface="Times New Roman" panose="02020603050405020304" pitchFamily="18" charset="0"/>
+                <a:cs typeface="Times New Roman" panose="02020603050405020304" pitchFamily="18" charset="0"/>
+              </a:rPr>
+              <a:t>I</a:t>
+            </a:r>
+            <a:r>
+              <a:rPr lang="en-US" sz="2800" b="1" baseline="-25000" dirty="0">
+                <a:latin typeface="Times New Roman" panose="02020603050405020304" pitchFamily="18" charset="0"/>
+                <a:cs typeface="Times New Roman" panose="02020603050405020304" pitchFamily="18" charset="0"/>
+              </a:rPr>
+              <a:t>1</a:t>
+            </a:r>
+            <a:endParaRPr lang="en-SG" sz="2800" b="1" baseline="-25000" dirty="0">
+              <a:latin typeface="Times New Roman" panose="02020603050405020304" pitchFamily="18" charset="0"/>
+              <a:cs typeface="Times New Roman" panose="02020603050405020304" pitchFamily="18" charset="0"/>
+            </a:endParaRPr>
+          </a:p>
+        </p:txBody>
+      </p:sp>
+      <p:sp>
+        <p:nvSpPr>
+          <p:cNvPr id="35" name="TextBox 34">
+            <a:extLst>
+              <a:ext uri="{FF2B5EF4-FFF2-40B4-BE49-F238E27FC236}">
+                <a16:creationId xmlns:a16="http://schemas.microsoft.com/office/drawing/2014/main" id="{3275CFDA-EA42-6ECB-422D-57B1D1620DB7}"/>
+              </a:ext>
+            </a:extLst>
+          </p:cNvPr>
+          <p:cNvSpPr txBox="1"/>
+          <p:nvPr/>
+        </p:nvSpPr>
+        <p:spPr>
+          <a:xfrm>
+            <a:off x="3886200" y="3133789"/>
+            <a:ext cx="552450" cy="523220"/>
+          </a:xfrm>
+          <a:prstGeom prst="rect">
+            <a:avLst/>
+          </a:prstGeom>
+          <a:noFill/>
+        </p:spPr>
+        <p:txBody>
+          <a:bodyPr wrap="square" rtlCol="0">
+            <a:spAutoFit/>
+          </a:bodyPr>
+          <a:lstStyle/>
+          <a:p>
+            <a:r>
+              <a:rPr lang="en-US" sz="2800" b="1" dirty="0">
+                <a:latin typeface="Times New Roman" panose="02020603050405020304" pitchFamily="18" charset="0"/>
+                <a:cs typeface="Times New Roman" panose="02020603050405020304" pitchFamily="18" charset="0"/>
+              </a:rPr>
+              <a:t>I</a:t>
+            </a:r>
+            <a:r>
+              <a:rPr lang="en-US" sz="2800" b="1" baseline="-25000" dirty="0">
+                <a:latin typeface="Times New Roman" panose="02020603050405020304" pitchFamily="18" charset="0"/>
+                <a:cs typeface="Times New Roman" panose="02020603050405020304" pitchFamily="18" charset="0"/>
+              </a:rPr>
+              <a:t>2</a:t>
+            </a:r>
+            <a:endParaRPr lang="en-SG" sz="2800" b="1" baseline="-25000" dirty="0">
+              <a:latin typeface="Times New Roman" panose="02020603050405020304" pitchFamily="18" charset="0"/>
+              <a:cs typeface="Times New Roman" panose="02020603050405020304" pitchFamily="18" charset="0"/>
+            </a:endParaRPr>
+          </a:p>
+        </p:txBody>
+      </p:sp>
+      <p:sp>
+        <p:nvSpPr>
+          <p:cNvPr id="36" name="TextBox 35">
+            <a:extLst>
+              <a:ext uri="{FF2B5EF4-FFF2-40B4-BE49-F238E27FC236}">
+                <a16:creationId xmlns:a16="http://schemas.microsoft.com/office/drawing/2014/main" id="{CB0001C4-EE5E-1CC4-8871-E88105EDAF66}"/>
+              </a:ext>
+            </a:extLst>
+          </p:cNvPr>
+          <p:cNvSpPr txBox="1"/>
+          <p:nvPr/>
+        </p:nvSpPr>
+        <p:spPr>
+          <a:xfrm>
+            <a:off x="3886200" y="4138940"/>
+            <a:ext cx="552450" cy="523220"/>
+          </a:xfrm>
+          <a:prstGeom prst="rect">
+            <a:avLst/>
+          </a:prstGeom>
+          <a:noFill/>
+        </p:spPr>
+        <p:txBody>
+          <a:bodyPr wrap="square" rtlCol="0">
+            <a:spAutoFit/>
+          </a:bodyPr>
+          <a:lstStyle/>
+          <a:p>
+            <a:r>
+              <a:rPr lang="en-US" sz="2800" b="1" dirty="0">
+                <a:latin typeface="Times New Roman" panose="02020603050405020304" pitchFamily="18" charset="0"/>
+                <a:cs typeface="Times New Roman" panose="02020603050405020304" pitchFamily="18" charset="0"/>
+              </a:rPr>
+              <a:t>I</a:t>
+            </a:r>
+            <a:r>
+              <a:rPr lang="en-US" sz="2800" b="1" baseline="-25000" dirty="0">
+                <a:latin typeface="Times New Roman" panose="02020603050405020304" pitchFamily="18" charset="0"/>
+                <a:cs typeface="Times New Roman" panose="02020603050405020304" pitchFamily="18" charset="0"/>
+              </a:rPr>
+              <a:t>3</a:t>
+            </a:r>
+            <a:endParaRPr lang="en-SG" sz="2800" b="1" baseline="-25000" dirty="0">
+              <a:latin typeface="Times New Roman" panose="02020603050405020304" pitchFamily="18" charset="0"/>
+              <a:cs typeface="Times New Roman" panose="02020603050405020304" pitchFamily="18" charset="0"/>
+            </a:endParaRPr>
+          </a:p>
+        </p:txBody>
+      </p:sp>
+      <p:sp>
+        <p:nvSpPr>
+          <p:cNvPr id="37" name="TextBox 36">
+            <a:extLst>
+              <a:ext uri="{FF2B5EF4-FFF2-40B4-BE49-F238E27FC236}">
+                <a16:creationId xmlns:a16="http://schemas.microsoft.com/office/drawing/2014/main" id="{21665F4E-89B1-6E17-0362-C69F9DBE1FFE}"/>
+              </a:ext>
+            </a:extLst>
+          </p:cNvPr>
+          <p:cNvSpPr txBox="1"/>
+          <p:nvPr/>
+        </p:nvSpPr>
+        <p:spPr>
+          <a:xfrm>
+            <a:off x="5910150" y="5362049"/>
+            <a:ext cx="552450" cy="523220"/>
+          </a:xfrm>
+          <a:prstGeom prst="rect">
+            <a:avLst/>
+          </a:prstGeom>
+          <a:noFill/>
+        </p:spPr>
+        <p:txBody>
+          <a:bodyPr wrap="square" rtlCol="0">
+            <a:spAutoFit/>
+          </a:bodyPr>
+          <a:lstStyle/>
+          <a:p>
+            <a:r>
+              <a:rPr lang="en-US" sz="2800" b="1" dirty="0">
+                <a:latin typeface="Times New Roman" panose="02020603050405020304" pitchFamily="18" charset="0"/>
+                <a:cs typeface="Times New Roman" panose="02020603050405020304" pitchFamily="18" charset="0"/>
+              </a:rPr>
+              <a:t>S</a:t>
+            </a:r>
+            <a:r>
+              <a:rPr lang="en-US" sz="2800" b="1" baseline="-25000" dirty="0">
+                <a:latin typeface="Times New Roman" panose="02020603050405020304" pitchFamily="18" charset="0"/>
+                <a:cs typeface="Times New Roman" panose="02020603050405020304" pitchFamily="18" charset="0"/>
+              </a:rPr>
+              <a:t>1</a:t>
+            </a:r>
+            <a:endParaRPr lang="en-SG" sz="2800" b="1" baseline="-25000" dirty="0">
+              <a:latin typeface="Times New Roman" panose="02020603050405020304" pitchFamily="18" charset="0"/>
+              <a:cs typeface="Times New Roman" panose="02020603050405020304" pitchFamily="18" charset="0"/>
+            </a:endParaRPr>
+          </a:p>
+        </p:txBody>
+      </p:sp>
+      <p:sp>
+        <p:nvSpPr>
+          <p:cNvPr id="38" name="TextBox 37">
+            <a:extLst>
+              <a:ext uri="{FF2B5EF4-FFF2-40B4-BE49-F238E27FC236}">
+                <a16:creationId xmlns:a16="http://schemas.microsoft.com/office/drawing/2014/main" id="{57FCA991-A98A-DC19-0148-06093726FB34}"/>
+              </a:ext>
+            </a:extLst>
+          </p:cNvPr>
+          <p:cNvSpPr txBox="1"/>
+          <p:nvPr/>
+        </p:nvSpPr>
+        <p:spPr>
+          <a:xfrm>
+            <a:off x="6410325" y="5419694"/>
+            <a:ext cx="552450" cy="523220"/>
+          </a:xfrm>
+          <a:prstGeom prst="rect">
+            <a:avLst/>
+          </a:prstGeom>
+          <a:noFill/>
+        </p:spPr>
+        <p:txBody>
+          <a:bodyPr wrap="square" rtlCol="0">
+            <a:spAutoFit/>
+          </a:bodyPr>
+          <a:lstStyle/>
+          <a:p>
+            <a:r>
+              <a:rPr lang="en-US" sz="2800" b="1" dirty="0">
+                <a:latin typeface="Times New Roman" panose="02020603050405020304" pitchFamily="18" charset="0"/>
+                <a:cs typeface="Times New Roman" panose="02020603050405020304" pitchFamily="18" charset="0"/>
+              </a:rPr>
+              <a:t>S</a:t>
+            </a:r>
+            <a:r>
+              <a:rPr lang="en-US" sz="2800" b="1" baseline="-25000" dirty="0">
+                <a:latin typeface="Times New Roman" panose="02020603050405020304" pitchFamily="18" charset="0"/>
+                <a:cs typeface="Times New Roman" panose="02020603050405020304" pitchFamily="18" charset="0"/>
+              </a:rPr>
+              <a:t>0</a:t>
+            </a:r>
+            <a:endParaRPr lang="en-SG" sz="2800" b="1" baseline="-25000" dirty="0">
+              <a:latin typeface="Times New Roman" panose="02020603050405020304" pitchFamily="18" charset="0"/>
+              <a:cs typeface="Times New Roman" panose="02020603050405020304" pitchFamily="18" charset="0"/>
+            </a:endParaRPr>
+          </a:p>
+        </p:txBody>
+      </p:sp>
+      <p:sp>
+        <p:nvSpPr>
+          <p:cNvPr id="39" name="TextBox 38">
+            <a:extLst>
+              <a:ext uri="{FF2B5EF4-FFF2-40B4-BE49-F238E27FC236}">
+                <a16:creationId xmlns:a16="http://schemas.microsoft.com/office/drawing/2014/main" id="{CB6D8D3A-B5CF-BC90-053A-7EB3E351F130}"/>
+              </a:ext>
+            </a:extLst>
+          </p:cNvPr>
+          <p:cNvSpPr txBox="1"/>
+          <p:nvPr/>
+        </p:nvSpPr>
+        <p:spPr>
+          <a:xfrm>
+            <a:off x="7983738" y="2719704"/>
+            <a:ext cx="552450" cy="523220"/>
+          </a:xfrm>
+          <a:prstGeom prst="rect">
+            <a:avLst/>
+          </a:prstGeom>
+          <a:noFill/>
+        </p:spPr>
+        <p:txBody>
+          <a:bodyPr wrap="square" rtlCol="0">
+            <a:spAutoFit/>
+          </a:bodyPr>
+          <a:lstStyle/>
+          <a:p>
+            <a:r>
+              <a:rPr lang="en-US" sz="2800" b="1">
+                <a:latin typeface="Times New Roman" panose="02020603050405020304" pitchFamily="18" charset="0"/>
+                <a:cs typeface="Times New Roman" panose="02020603050405020304" pitchFamily="18" charset="0"/>
+              </a:rPr>
+              <a:t>Y</a:t>
+            </a:r>
+            <a:endParaRPr lang="en-SG" sz="2800" b="1" baseline="-25000" dirty="0">
+              <a:latin typeface="Times New Roman" panose="02020603050405020304" pitchFamily="18" charset="0"/>
+              <a:cs typeface="Times New Roman" panose="02020603050405020304" pitchFamily="18" charset="0"/>
+            </a:endParaRPr>
+          </a:p>
+        </p:txBody>
+      </p:sp>
+    </p:spTree>
+    <p:extLst>
+      <p:ext uri="{BB962C8B-B14F-4D97-AF65-F5344CB8AC3E}">
+        <p14:creationId xmlns:p14="http://schemas.microsoft.com/office/powerpoint/2010/main" val="4159776087"/>
+      </p:ext>
+    </p:extLst>
+  </p:cSld>
+  <p:clrMapOvr>
+    <a:masterClrMapping/>
+  </p:clrMapOvr>
+</p:sld>
+</file>
+
+<file path=ppt/slides/slide3.xml><?xml version="1.0" encoding="utf-8"?>
+<p:sld xmlns:a="http://schemas.openxmlformats.org/drawingml/2006/main" xmlns:r="http://schemas.openxmlformats.org/officeDocument/2006/relationships" xmlns:p="http://schemas.openxmlformats.org/presentationml/2006/main">
+  <p:cSld>
+    <p:spTree>
+      <p:nvGrpSpPr>
+        <p:cNvPr id="1" name=""/>
+        <p:cNvGrpSpPr/>
+        <p:nvPr/>
+      </p:nvGrpSpPr>
+      <p:grpSpPr>
+        <a:xfrm>
+          <a:off x="0" y="0"/>
+          <a:ext cx="0" cy="0"/>
+          <a:chOff x="0" y="0"/>
+          <a:chExt cx="0" cy="0"/>
+        </a:xfrm>
+      </p:grpSpPr>
+      <p:pic>
+        <p:nvPicPr>
+          <p:cNvPr id="1026" name="Picture 2">
+            <a:extLst>
+              <a:ext uri="{FF2B5EF4-FFF2-40B4-BE49-F238E27FC236}">
+                <a16:creationId xmlns:a16="http://schemas.microsoft.com/office/drawing/2014/main" id="{3877D318-2ECD-9558-E58B-CC97C87A144F}"/>
+              </a:ext>
+            </a:extLst>
+          </p:cNvPr>
+          <p:cNvPicPr>
+            <a:picLocks noChangeAspect="1" noChangeArrowheads="1"/>
+          </p:cNvPicPr>
+          <p:nvPr/>
+        </p:nvPicPr>
+        <p:blipFill>
+          <a:blip r:embed="rId2">
+            <a:extLst>
+              <a:ext uri="{BEBA8EAE-BF5A-486C-A8C5-ECC9F3942E4B}">
+                <a14:imgProps xmlns:a14="http://schemas.microsoft.com/office/drawing/2010/main">
+                  <a14:imgLayer r:embed="rId3">
+                    <a14:imgEffect>
+                      <a14:sharpenSoften amount="50000"/>
+                    </a14:imgEffect>
+                    <a14:imgEffect>
+                      <a14:brightnessContrast bright="-40000" contrast="-40000"/>
+                    </a14:imgEffect>
+                  </a14:imgLayer>
+                </a14:imgProps>
+              </a:ext>
+              <a:ext uri="{28A0092B-C50C-407E-A947-70E740481C1C}">
+                <a14:useLocalDpi xmlns:a14="http://schemas.microsoft.com/office/drawing/2010/main" val="0"/>
+              </a:ext>
+            </a:extLst>
+          </a:blip>
+          <a:srcRect/>
+          <a:stretch>
+            <a:fillRect/>
+          </a:stretch>
+        </p:blipFill>
+        <p:spPr bwMode="auto">
+          <a:xfrm>
+            <a:off x="933450" y="0"/>
+            <a:ext cx="10325100" cy="6877902"/>
+          </a:xfrm>
+          <a:prstGeom prst="rect">
+            <a:avLst/>
+          </a:prstGeom>
+          <a:noFill/>
+          <a:extLst>
+            <a:ext uri="{909E8E84-426E-40DD-AFC4-6F175D3DCCD1}">
+              <a14:hiddenFill xmlns:a14="http://schemas.microsoft.com/office/drawing/2010/main">
+                <a:solidFill>
+                  <a:srgbClr val="FFFFFF"/>
+                </a:solidFill>
+              </a14:hiddenFill>
+            </a:ext>
+          </a:extLst>
+        </p:spPr>
+      </p:pic>
+    </p:spTree>
+    <p:extLst>
+      <p:ext uri="{BB962C8B-B14F-4D97-AF65-F5344CB8AC3E}">
+        <p14:creationId xmlns:p14="http://schemas.microsoft.com/office/powerpoint/2010/main" val="764846171"/>
+      </p:ext>
+    </p:extLst>
+  </p:cSld>
+  <p:clrMapOvr>
+    <a:masterClrMapping/>
+  </p:clrMapOvr>
+</p:sld>
+</file>
+
 <file path=ppt/theme/theme1.xml><?xml version="1.0" encoding="utf-8"?>
 <a:theme xmlns:a="http://schemas.openxmlformats.org/drawingml/2006/main" name="Office Theme">
   <a:themeElements>

</xml_diff>

<commit_message>
function added, fix truth table
</commit_message>
<xml_diff>
--- a/media/MUX.pptx
+++ b/media/MUX.pptx
@@ -7,7 +7,8 @@
   <p:sldIdLst>
     <p:sldId id="256" r:id="rId2"/>
     <p:sldId id="258" r:id="rId3"/>
-    <p:sldId id="257" r:id="rId4"/>
+    <p:sldId id="259" r:id="rId4"/>
+    <p:sldId id="257" r:id="rId5"/>
   </p:sldIdLst>
   <p:sldSz cx="12192000" cy="6858000"/>
   <p:notesSz cx="6858000" cy="9144000"/>
@@ -263,7 +264,7 @@
           <a:p>
             <a:fld id="{480B0891-7744-4FB6-A46C-A0659091833E}" type="datetimeFigureOut">
               <a:rPr lang="en-SG" smtClean="0"/>
-              <a:t>19/12/2024</a:t>
+              <a:t>22/12/2024</a:t>
             </a:fld>
             <a:endParaRPr lang="en-SG"/>
           </a:p>
@@ -463,7 +464,7 @@
           <a:p>
             <a:fld id="{480B0891-7744-4FB6-A46C-A0659091833E}" type="datetimeFigureOut">
               <a:rPr lang="en-SG" smtClean="0"/>
-              <a:t>19/12/2024</a:t>
+              <a:t>22/12/2024</a:t>
             </a:fld>
             <a:endParaRPr lang="en-SG"/>
           </a:p>
@@ -673,7 +674,7 @@
           <a:p>
             <a:fld id="{480B0891-7744-4FB6-A46C-A0659091833E}" type="datetimeFigureOut">
               <a:rPr lang="en-SG" smtClean="0"/>
-              <a:t>19/12/2024</a:t>
+              <a:t>22/12/2024</a:t>
             </a:fld>
             <a:endParaRPr lang="en-SG"/>
           </a:p>
@@ -873,7 +874,7 @@
           <a:p>
             <a:fld id="{480B0891-7744-4FB6-A46C-A0659091833E}" type="datetimeFigureOut">
               <a:rPr lang="en-SG" smtClean="0"/>
-              <a:t>19/12/2024</a:t>
+              <a:t>22/12/2024</a:t>
             </a:fld>
             <a:endParaRPr lang="en-SG"/>
           </a:p>
@@ -1149,7 +1150,7 @@
           <a:p>
             <a:fld id="{480B0891-7744-4FB6-A46C-A0659091833E}" type="datetimeFigureOut">
               <a:rPr lang="en-SG" smtClean="0"/>
-              <a:t>19/12/2024</a:t>
+              <a:t>22/12/2024</a:t>
             </a:fld>
             <a:endParaRPr lang="en-SG"/>
           </a:p>
@@ -1417,7 +1418,7 @@
           <a:p>
             <a:fld id="{480B0891-7744-4FB6-A46C-A0659091833E}" type="datetimeFigureOut">
               <a:rPr lang="en-SG" smtClean="0"/>
-              <a:t>19/12/2024</a:t>
+              <a:t>22/12/2024</a:t>
             </a:fld>
             <a:endParaRPr lang="en-SG"/>
           </a:p>
@@ -1832,7 +1833,7 @@
           <a:p>
             <a:fld id="{480B0891-7744-4FB6-A46C-A0659091833E}" type="datetimeFigureOut">
               <a:rPr lang="en-SG" smtClean="0"/>
-              <a:t>19/12/2024</a:t>
+              <a:t>22/12/2024</a:t>
             </a:fld>
             <a:endParaRPr lang="en-SG"/>
           </a:p>
@@ -1974,7 +1975,7 @@
           <a:p>
             <a:fld id="{480B0891-7744-4FB6-A46C-A0659091833E}" type="datetimeFigureOut">
               <a:rPr lang="en-SG" smtClean="0"/>
-              <a:t>19/12/2024</a:t>
+              <a:t>22/12/2024</a:t>
             </a:fld>
             <a:endParaRPr lang="en-SG"/>
           </a:p>
@@ -2087,7 +2088,7 @@
           <a:p>
             <a:fld id="{480B0891-7744-4FB6-A46C-A0659091833E}" type="datetimeFigureOut">
               <a:rPr lang="en-SG" smtClean="0"/>
-              <a:t>19/12/2024</a:t>
+              <a:t>22/12/2024</a:t>
             </a:fld>
             <a:endParaRPr lang="en-SG"/>
           </a:p>
@@ -2400,7 +2401,7 @@
           <a:p>
             <a:fld id="{480B0891-7744-4FB6-A46C-A0659091833E}" type="datetimeFigureOut">
               <a:rPr lang="en-SG" smtClean="0"/>
-              <a:t>19/12/2024</a:t>
+              <a:t>22/12/2024</a:t>
             </a:fld>
             <a:endParaRPr lang="en-SG"/>
           </a:p>
@@ -2689,7 +2690,7 @@
           <a:p>
             <a:fld id="{480B0891-7744-4FB6-A46C-A0659091833E}" type="datetimeFigureOut">
               <a:rPr lang="en-SG" smtClean="0"/>
-              <a:t>19/12/2024</a:t>
+              <a:t>22/12/2024</a:t>
             </a:fld>
             <a:endParaRPr lang="en-SG"/>
           </a:p>
@@ -2932,7 +2933,7 @@
           <a:p>
             <a:fld id="{480B0891-7744-4FB6-A46C-A0659091833E}" type="datetimeFigureOut">
               <a:rPr lang="en-SG" smtClean="0"/>
-              <a:t>19/12/2024</a:t>
+              <a:t>22/12/2024</a:t>
             </a:fld>
             <a:endParaRPr lang="en-SG"/>
           </a:p>
@@ -4717,6 +4718,173 @@
           <a:chExt cx="0" cy="0"/>
         </a:xfrm>
       </p:grpSpPr>
+      <p:grpSp>
+        <p:nvGrpSpPr>
+          <p:cNvPr id="20" name="Group 19">
+            <a:extLst>
+              <a:ext uri="{FF2B5EF4-FFF2-40B4-BE49-F238E27FC236}">
+                <a16:creationId xmlns:a16="http://schemas.microsoft.com/office/drawing/2014/main" id="{6983205A-A126-E73F-DC18-D8AD585807A8}"/>
+              </a:ext>
+            </a:extLst>
+          </p:cNvPr>
+          <p:cNvGrpSpPr/>
+          <p:nvPr/>
+        </p:nvGrpSpPr>
+        <p:grpSpPr>
+          <a:xfrm>
+            <a:off x="3486535" y="729000"/>
+            <a:ext cx="5400000" cy="5400000"/>
+            <a:chOff x="3486535" y="729000"/>
+            <a:chExt cx="5400000" cy="5400000"/>
+          </a:xfrm>
+        </p:grpSpPr>
+        <p:sp>
+          <p:nvSpPr>
+            <p:cNvPr id="3" name="Rectangle: Rounded Corners 2">
+              <a:extLst>
+                <a:ext uri="{FF2B5EF4-FFF2-40B4-BE49-F238E27FC236}">
+                  <a16:creationId xmlns:a16="http://schemas.microsoft.com/office/drawing/2014/main" id="{7387C88D-5F5E-2BE4-12F4-078B056E5C28}"/>
+                </a:ext>
+              </a:extLst>
+            </p:cNvPr>
+            <p:cNvSpPr/>
+            <p:nvPr/>
+          </p:nvSpPr>
+          <p:spPr>
+            <a:xfrm>
+              <a:off x="3486535" y="729000"/>
+              <a:ext cx="5400000" cy="5400000"/>
+            </a:xfrm>
+            <a:prstGeom prst="roundRect">
+              <a:avLst/>
+            </a:prstGeom>
+            <a:solidFill>
+              <a:schemeClr val="bg1"/>
+            </a:solidFill>
+            <a:ln w="12700">
+              <a:solidFill>
+                <a:schemeClr val="tx1"/>
+              </a:solidFill>
+            </a:ln>
+          </p:spPr>
+          <p:style>
+            <a:lnRef idx="2">
+              <a:schemeClr val="accent1">
+                <a:shade val="15000"/>
+              </a:schemeClr>
+            </a:lnRef>
+            <a:fillRef idx="1">
+              <a:schemeClr val="accent1"/>
+            </a:fillRef>
+            <a:effectRef idx="0">
+              <a:schemeClr val="accent1"/>
+            </a:effectRef>
+            <a:fontRef idx="minor">
+              <a:schemeClr val="lt1"/>
+            </a:fontRef>
+          </p:style>
+          <p:txBody>
+            <a:bodyPr rtlCol="0" anchor="ctr"/>
+            <a:lstStyle/>
+            <a:p>
+              <a:pPr algn="ctr"/>
+              <a:endParaRPr lang="en-SG"/>
+            </a:p>
+          </p:txBody>
+        </p:sp>
+        <p:pic>
+          <p:nvPicPr>
+            <p:cNvPr id="1028" name="Picture 4" descr="What are Multiplexers and Demultiplexers? | RS">
+              <a:extLst>
+                <a:ext uri="{FF2B5EF4-FFF2-40B4-BE49-F238E27FC236}">
+                  <a16:creationId xmlns:a16="http://schemas.microsoft.com/office/drawing/2014/main" id="{B687D8DB-AAE6-AC5B-F828-0339DF23AE6A}"/>
+                </a:ext>
+              </a:extLst>
+            </p:cNvPr>
+            <p:cNvPicPr>
+              <a:picLocks noChangeAspect="1" noChangeArrowheads="1"/>
+            </p:cNvPicPr>
+            <p:nvPr/>
+          </p:nvPicPr>
+          <p:blipFill>
+            <a:blip r:embed="rId2">
+              <a:extLst>
+                <a:ext uri="{BEBA8EAE-BF5A-486C-A8C5-ECC9F3942E4B}">
+                  <a14:imgProps xmlns:a14="http://schemas.microsoft.com/office/drawing/2010/main">
+                    <a14:imgLayer r:embed="rId3">
+                      <a14:imgEffect>
+                        <a14:backgroundRemoval t="7510" b="94856" l="5583" r="94917">
+                          <a14:foregroundMark x1="33583" y1="94856" x2="33750" y2="87860"/>
+                          <a14:foregroundMark x1="89583" y1="21502" x2="94917" y2="54630"/>
+                          <a14:foregroundMark x1="77333" y1="10905" x2="71750" y2="7613"/>
+                          <a14:foregroundMark x1="5583" y1="63992" x2="9083" y2="53498"/>
+                          <a14:foregroundMark x1="5583" y1="52263" x2="8667" y2="49280"/>
+                        </a14:backgroundRemoval>
+                      </a14:imgEffect>
+                    </a14:imgLayer>
+                  </a14:imgProps>
+                </a:ext>
+                <a:ext uri="{28A0092B-C50C-407E-A947-70E740481C1C}">
+                  <a14:useLocalDpi xmlns:a14="http://schemas.microsoft.com/office/drawing/2010/main" val="0"/>
+                </a:ext>
+              </a:extLst>
+            </a:blip>
+            <a:srcRect/>
+            <a:stretch>
+              <a:fillRect/>
+            </a:stretch>
+          </p:blipFill>
+          <p:spPr bwMode="auto">
+            <a:xfrm>
+              <a:off x="3486535" y="1241863"/>
+              <a:ext cx="5400000" cy="4374274"/>
+            </a:xfrm>
+            <a:prstGeom prst="rect">
+              <a:avLst/>
+            </a:prstGeom>
+            <a:noFill/>
+            <a:extLst>
+              <a:ext uri="{909E8E84-426E-40DD-AFC4-6F175D3DCCD1}">
+                <a14:hiddenFill xmlns:a14="http://schemas.microsoft.com/office/drawing/2010/main">
+                  <a:solidFill>
+                    <a:srgbClr val="FFFFFF"/>
+                  </a:solidFill>
+                </a14:hiddenFill>
+              </a:ext>
+            </a:extLst>
+          </p:spPr>
+        </p:pic>
+      </p:grpSp>
+    </p:spTree>
+    <p:extLst>
+      <p:ext uri="{BB962C8B-B14F-4D97-AF65-F5344CB8AC3E}">
+        <p14:creationId xmlns:p14="http://schemas.microsoft.com/office/powerpoint/2010/main" val="4079975688"/>
+      </p:ext>
+    </p:extLst>
+  </p:cSld>
+  <p:clrMapOvr>
+    <a:masterClrMapping/>
+  </p:clrMapOvr>
+</p:sld>
+</file>
+
+<file path=ppt/slides/slide4.xml><?xml version="1.0" encoding="utf-8"?>
+<p:sld xmlns:a="http://schemas.openxmlformats.org/drawingml/2006/main" xmlns:r="http://schemas.openxmlformats.org/officeDocument/2006/relationships" xmlns:p="http://schemas.openxmlformats.org/presentationml/2006/main">
+  <p:cSld>
+    <p:spTree>
+      <p:nvGrpSpPr>
+        <p:cNvPr id="1" name=""/>
+        <p:cNvGrpSpPr/>
+        <p:nvPr/>
+      </p:nvGrpSpPr>
+      <p:grpSpPr>
+        <a:xfrm>
+          <a:off x="0" y="0"/>
+          <a:ext cx="0" cy="0"/>
+          <a:chOff x="0" y="0"/>
+          <a:chExt cx="0" cy="0"/>
+        </a:xfrm>
+      </p:grpSpPr>
       <p:pic>
         <p:nvPicPr>
           <p:cNvPr id="1026" name="Picture 2">

</xml_diff>

<commit_message>
resources + about done, practise qn mid way
</commit_message>
<xml_diff>
--- a/media/MUX.pptx
+++ b/media/MUX.pptx
@@ -7,8 +7,9 @@
   <p:sldIdLst>
     <p:sldId id="256" r:id="rId2"/>
     <p:sldId id="258" r:id="rId3"/>
-    <p:sldId id="259" r:id="rId4"/>
-    <p:sldId id="257" r:id="rId5"/>
+    <p:sldId id="260" r:id="rId4"/>
+    <p:sldId id="259" r:id="rId5"/>
+    <p:sldId id="257" r:id="rId6"/>
   </p:sldIdLst>
   <p:sldSz cx="12192000" cy="6858000"/>
   <p:notesSz cx="6858000" cy="9144000"/>
@@ -264,7 +265,7 @@
           <a:p>
             <a:fld id="{480B0891-7744-4FB6-A46C-A0659091833E}" type="datetimeFigureOut">
               <a:rPr lang="en-SG" smtClean="0"/>
-              <a:t>22/12/2024</a:t>
+              <a:t>23/12/2024</a:t>
             </a:fld>
             <a:endParaRPr lang="en-SG"/>
           </a:p>
@@ -464,7 +465,7 @@
           <a:p>
             <a:fld id="{480B0891-7744-4FB6-A46C-A0659091833E}" type="datetimeFigureOut">
               <a:rPr lang="en-SG" smtClean="0"/>
-              <a:t>22/12/2024</a:t>
+              <a:t>23/12/2024</a:t>
             </a:fld>
             <a:endParaRPr lang="en-SG"/>
           </a:p>
@@ -674,7 +675,7 @@
           <a:p>
             <a:fld id="{480B0891-7744-4FB6-A46C-A0659091833E}" type="datetimeFigureOut">
               <a:rPr lang="en-SG" smtClean="0"/>
-              <a:t>22/12/2024</a:t>
+              <a:t>23/12/2024</a:t>
             </a:fld>
             <a:endParaRPr lang="en-SG"/>
           </a:p>
@@ -874,7 +875,7 @@
           <a:p>
             <a:fld id="{480B0891-7744-4FB6-A46C-A0659091833E}" type="datetimeFigureOut">
               <a:rPr lang="en-SG" smtClean="0"/>
-              <a:t>22/12/2024</a:t>
+              <a:t>23/12/2024</a:t>
             </a:fld>
             <a:endParaRPr lang="en-SG"/>
           </a:p>
@@ -1150,7 +1151,7 @@
           <a:p>
             <a:fld id="{480B0891-7744-4FB6-A46C-A0659091833E}" type="datetimeFigureOut">
               <a:rPr lang="en-SG" smtClean="0"/>
-              <a:t>22/12/2024</a:t>
+              <a:t>23/12/2024</a:t>
             </a:fld>
             <a:endParaRPr lang="en-SG"/>
           </a:p>
@@ -1418,7 +1419,7 @@
           <a:p>
             <a:fld id="{480B0891-7744-4FB6-A46C-A0659091833E}" type="datetimeFigureOut">
               <a:rPr lang="en-SG" smtClean="0"/>
-              <a:t>22/12/2024</a:t>
+              <a:t>23/12/2024</a:t>
             </a:fld>
             <a:endParaRPr lang="en-SG"/>
           </a:p>
@@ -1833,7 +1834,7 @@
           <a:p>
             <a:fld id="{480B0891-7744-4FB6-A46C-A0659091833E}" type="datetimeFigureOut">
               <a:rPr lang="en-SG" smtClean="0"/>
-              <a:t>22/12/2024</a:t>
+              <a:t>23/12/2024</a:t>
             </a:fld>
             <a:endParaRPr lang="en-SG"/>
           </a:p>
@@ -1975,7 +1976,7 @@
           <a:p>
             <a:fld id="{480B0891-7744-4FB6-A46C-A0659091833E}" type="datetimeFigureOut">
               <a:rPr lang="en-SG" smtClean="0"/>
-              <a:t>22/12/2024</a:t>
+              <a:t>23/12/2024</a:t>
             </a:fld>
             <a:endParaRPr lang="en-SG"/>
           </a:p>
@@ -2088,7 +2089,7 @@
           <a:p>
             <a:fld id="{480B0891-7744-4FB6-A46C-A0659091833E}" type="datetimeFigureOut">
               <a:rPr lang="en-SG" smtClean="0"/>
-              <a:t>22/12/2024</a:t>
+              <a:t>23/12/2024</a:t>
             </a:fld>
             <a:endParaRPr lang="en-SG"/>
           </a:p>
@@ -2401,7 +2402,7 @@
           <a:p>
             <a:fld id="{480B0891-7744-4FB6-A46C-A0659091833E}" type="datetimeFigureOut">
               <a:rPr lang="en-SG" smtClean="0"/>
-              <a:t>22/12/2024</a:t>
+              <a:t>23/12/2024</a:t>
             </a:fld>
             <a:endParaRPr lang="en-SG"/>
           </a:p>
@@ -2690,7 +2691,7 @@
           <a:p>
             <a:fld id="{480B0891-7744-4FB6-A46C-A0659091833E}" type="datetimeFigureOut">
               <a:rPr lang="en-SG" smtClean="0"/>
-              <a:t>22/12/2024</a:t>
+              <a:t>23/12/2024</a:t>
             </a:fld>
             <a:endParaRPr lang="en-SG"/>
           </a:p>
@@ -2933,7 +2934,7 @@
           <a:p>
             <a:fld id="{480B0891-7744-4FB6-A46C-A0659091833E}" type="datetimeFigureOut">
               <a:rPr lang="en-SG" smtClean="0"/>
-              <a:t>22/12/2024</a:t>
+              <a:t>23/12/2024</a:t>
             </a:fld>
             <a:endParaRPr lang="en-SG"/>
           </a:p>
@@ -4706,6 +4707,433 @@
   <p:cSld>
     <p:spTree>
       <p:nvGrpSpPr>
+        <p:cNvPr id="1" name="">
+          <a:extLst>
+            <a:ext uri="{FF2B5EF4-FFF2-40B4-BE49-F238E27FC236}">
+              <a16:creationId xmlns:a16="http://schemas.microsoft.com/office/drawing/2014/main" id="{C6010B7A-D72D-13FA-9D42-B70AF47313D4}"/>
+            </a:ext>
+          </a:extLst>
+        </p:cNvPr>
+        <p:cNvGrpSpPr/>
+        <p:nvPr/>
+      </p:nvGrpSpPr>
+      <p:grpSpPr>
+        <a:xfrm>
+          <a:off x="0" y="0"/>
+          <a:ext cx="0" cy="0"/>
+          <a:chOff x="0" y="0"/>
+          <a:chExt cx="0" cy="0"/>
+        </a:xfrm>
+      </p:grpSpPr>
+      <p:sp>
+        <p:nvSpPr>
+          <p:cNvPr id="3" name="Rectangle 2">
+            <a:extLst>
+              <a:ext uri="{FF2B5EF4-FFF2-40B4-BE49-F238E27FC236}">
+                <a16:creationId xmlns:a16="http://schemas.microsoft.com/office/drawing/2014/main" id="{3F880862-CAB0-7BD6-A4DA-3C34D6F45D1F}"/>
+              </a:ext>
+            </a:extLst>
+          </p:cNvPr>
+          <p:cNvSpPr/>
+          <p:nvPr/>
+        </p:nvSpPr>
+        <p:spPr>
+          <a:xfrm>
+            <a:off x="1323975" y="276225"/>
+            <a:ext cx="9934575" cy="6248400"/>
+          </a:xfrm>
+          <a:prstGeom prst="rect">
+            <a:avLst/>
+          </a:prstGeom>
+        </p:spPr>
+        <p:style>
+          <a:lnRef idx="2">
+            <a:schemeClr val="accent1">
+              <a:shade val="15000"/>
+            </a:schemeClr>
+          </a:lnRef>
+          <a:fillRef idx="1">
+            <a:schemeClr val="accent1"/>
+          </a:fillRef>
+          <a:effectRef idx="0">
+            <a:schemeClr val="accent1"/>
+          </a:effectRef>
+          <a:fontRef idx="minor">
+            <a:schemeClr val="lt1"/>
+          </a:fontRef>
+        </p:style>
+        <p:txBody>
+          <a:bodyPr rtlCol="0" anchor="ctr"/>
+          <a:lstStyle/>
+          <a:p>
+            <a:pPr algn="ctr"/>
+            <a:endParaRPr lang="en-SG"/>
+          </a:p>
+        </p:txBody>
+      </p:sp>
+      <p:grpSp>
+        <p:nvGrpSpPr>
+          <p:cNvPr id="9" name="Group 8">
+            <a:extLst>
+              <a:ext uri="{FF2B5EF4-FFF2-40B4-BE49-F238E27FC236}">
+                <a16:creationId xmlns:a16="http://schemas.microsoft.com/office/drawing/2014/main" id="{16BB4CF7-891D-B48F-F74C-8EE530BF665B}"/>
+              </a:ext>
+            </a:extLst>
+          </p:cNvPr>
+          <p:cNvGrpSpPr/>
+          <p:nvPr/>
+        </p:nvGrpSpPr>
+        <p:grpSpPr>
+          <a:xfrm>
+            <a:off x="3396000" y="542924"/>
+            <a:ext cx="5400000" cy="5400000"/>
+            <a:chOff x="3396000" y="542924"/>
+            <a:chExt cx="5400000" cy="5400000"/>
+          </a:xfrm>
+        </p:grpSpPr>
+        <p:pic>
+          <p:nvPicPr>
+            <p:cNvPr id="7" name="Picture 6">
+              <a:extLst>
+                <a:ext uri="{FF2B5EF4-FFF2-40B4-BE49-F238E27FC236}">
+                  <a16:creationId xmlns:a16="http://schemas.microsoft.com/office/drawing/2014/main" id="{35BDCAFC-F709-264C-BD07-EF8CC56682C3}"/>
+                </a:ext>
+              </a:extLst>
+            </p:cNvPr>
+            <p:cNvPicPr>
+              <a:picLocks noChangeAspect="1"/>
+            </p:cNvPicPr>
+            <p:nvPr/>
+          </p:nvPicPr>
+          <p:blipFill rotWithShape="1">
+            <a:blip r:embed="rId2"/>
+            <a:srcRect l="3889" r="7685"/>
+            <a:stretch/>
+          </p:blipFill>
+          <p:spPr>
+            <a:xfrm>
+              <a:off x="3396000" y="542924"/>
+              <a:ext cx="5400000" cy="5400000"/>
+            </a:xfrm>
+            <a:custGeom>
+              <a:avLst/>
+              <a:gdLst>
+                <a:gd name="connsiteX0" fmla="*/ 900018 w 5400000"/>
+                <a:gd name="connsiteY0" fmla="*/ 0 h 5400000"/>
+                <a:gd name="connsiteX1" fmla="*/ 4499982 w 5400000"/>
+                <a:gd name="connsiteY1" fmla="*/ 0 h 5400000"/>
+                <a:gd name="connsiteX2" fmla="*/ 5400000 w 5400000"/>
+                <a:gd name="connsiteY2" fmla="*/ 900018 h 5400000"/>
+                <a:gd name="connsiteX3" fmla="*/ 5400000 w 5400000"/>
+                <a:gd name="connsiteY3" fmla="*/ 4499982 h 5400000"/>
+                <a:gd name="connsiteX4" fmla="*/ 4499982 w 5400000"/>
+                <a:gd name="connsiteY4" fmla="*/ 5400000 h 5400000"/>
+                <a:gd name="connsiteX5" fmla="*/ 900018 w 5400000"/>
+                <a:gd name="connsiteY5" fmla="*/ 5400000 h 5400000"/>
+                <a:gd name="connsiteX6" fmla="*/ 0 w 5400000"/>
+                <a:gd name="connsiteY6" fmla="*/ 4499982 h 5400000"/>
+                <a:gd name="connsiteX7" fmla="*/ 0 w 5400000"/>
+                <a:gd name="connsiteY7" fmla="*/ 900018 h 5400000"/>
+                <a:gd name="connsiteX8" fmla="*/ 900018 w 5400000"/>
+                <a:gd name="connsiteY8" fmla="*/ 0 h 5400000"/>
+              </a:gdLst>
+              <a:ahLst/>
+              <a:cxnLst>
+                <a:cxn ang="0">
+                  <a:pos x="connsiteX0" y="connsiteY0"/>
+                </a:cxn>
+                <a:cxn ang="0">
+                  <a:pos x="connsiteX1" y="connsiteY1"/>
+                </a:cxn>
+                <a:cxn ang="0">
+                  <a:pos x="connsiteX2" y="connsiteY2"/>
+                </a:cxn>
+                <a:cxn ang="0">
+                  <a:pos x="connsiteX3" y="connsiteY3"/>
+                </a:cxn>
+                <a:cxn ang="0">
+                  <a:pos x="connsiteX4" y="connsiteY4"/>
+                </a:cxn>
+                <a:cxn ang="0">
+                  <a:pos x="connsiteX5" y="connsiteY5"/>
+                </a:cxn>
+                <a:cxn ang="0">
+                  <a:pos x="connsiteX6" y="connsiteY6"/>
+                </a:cxn>
+                <a:cxn ang="0">
+                  <a:pos x="connsiteX7" y="connsiteY7"/>
+                </a:cxn>
+                <a:cxn ang="0">
+                  <a:pos x="connsiteX8" y="connsiteY8"/>
+                </a:cxn>
+              </a:cxnLst>
+              <a:rect l="l" t="t" r="r" b="b"/>
+              <a:pathLst>
+                <a:path w="5400000" h="5400000">
+                  <a:moveTo>
+                    <a:pt x="900018" y="0"/>
+                  </a:moveTo>
+                  <a:lnTo>
+                    <a:pt x="4499982" y="0"/>
+                  </a:lnTo>
+                  <a:cubicBezTo>
+                    <a:pt x="4997048" y="0"/>
+                    <a:pt x="5400000" y="402952"/>
+                    <a:pt x="5400000" y="900018"/>
+                  </a:cubicBezTo>
+                  <a:lnTo>
+                    <a:pt x="5400000" y="4499982"/>
+                  </a:lnTo>
+                  <a:cubicBezTo>
+                    <a:pt x="5400000" y="4997048"/>
+                    <a:pt x="4997048" y="5400000"/>
+                    <a:pt x="4499982" y="5400000"/>
+                  </a:cubicBezTo>
+                  <a:lnTo>
+                    <a:pt x="900018" y="5400000"/>
+                  </a:lnTo>
+                  <a:cubicBezTo>
+                    <a:pt x="402952" y="5400000"/>
+                    <a:pt x="0" y="4997048"/>
+                    <a:pt x="0" y="4499982"/>
+                  </a:cubicBezTo>
+                  <a:lnTo>
+                    <a:pt x="0" y="900018"/>
+                  </a:lnTo>
+                  <a:cubicBezTo>
+                    <a:pt x="0" y="402952"/>
+                    <a:pt x="402952" y="0"/>
+                    <a:pt x="900018" y="0"/>
+                  </a:cubicBezTo>
+                  <a:close/>
+                </a:path>
+              </a:pathLst>
+            </a:custGeom>
+          </p:spPr>
+        </p:pic>
+        <p:sp>
+          <p:nvSpPr>
+            <p:cNvPr id="33" name="TextBox 32">
+              <a:extLst>
+                <a:ext uri="{FF2B5EF4-FFF2-40B4-BE49-F238E27FC236}">
+                  <a16:creationId xmlns:a16="http://schemas.microsoft.com/office/drawing/2014/main" id="{0E40FC38-466B-5EFB-0F31-571F1DF8E1E0}"/>
+                </a:ext>
+              </a:extLst>
+            </p:cNvPr>
+            <p:cNvSpPr txBox="1"/>
+            <p:nvPr/>
+          </p:nvSpPr>
+          <p:spPr>
+            <a:xfrm>
+              <a:off x="5276850" y="1112166"/>
+              <a:ext cx="552450" cy="523220"/>
+            </a:xfrm>
+            <a:prstGeom prst="rect">
+              <a:avLst/>
+            </a:prstGeom>
+            <a:solidFill>
+              <a:schemeClr val="bg1"/>
+            </a:solidFill>
+          </p:spPr>
+          <p:txBody>
+            <a:bodyPr wrap="square" rtlCol="0">
+              <a:spAutoFit/>
+            </a:bodyPr>
+            <a:lstStyle/>
+            <a:p>
+              <a:r>
+                <a:rPr lang="en-US" sz="2800" b="1" dirty="0">
+                  <a:latin typeface="Times New Roman" panose="02020603050405020304" pitchFamily="18" charset="0"/>
+                  <a:cs typeface="Times New Roman" panose="02020603050405020304" pitchFamily="18" charset="0"/>
+                </a:rPr>
+                <a:t>I</a:t>
+              </a:r>
+              <a:r>
+                <a:rPr lang="en-US" sz="2800" b="1" baseline="-25000" dirty="0">
+                  <a:latin typeface="Times New Roman" panose="02020603050405020304" pitchFamily="18" charset="0"/>
+                  <a:cs typeface="Times New Roman" panose="02020603050405020304" pitchFamily="18" charset="0"/>
+                </a:rPr>
+                <a:t>0</a:t>
+              </a:r>
+              <a:endParaRPr lang="en-SG" sz="2800" b="1" baseline="-25000" dirty="0">
+                <a:latin typeface="Times New Roman" panose="02020603050405020304" pitchFamily="18" charset="0"/>
+                <a:cs typeface="Times New Roman" panose="02020603050405020304" pitchFamily="18" charset="0"/>
+              </a:endParaRPr>
+            </a:p>
+          </p:txBody>
+        </p:sp>
+        <p:sp>
+          <p:nvSpPr>
+            <p:cNvPr id="34" name="TextBox 33">
+              <a:extLst>
+                <a:ext uri="{FF2B5EF4-FFF2-40B4-BE49-F238E27FC236}">
+                  <a16:creationId xmlns:a16="http://schemas.microsoft.com/office/drawing/2014/main" id="{1B4FCDF2-B8D1-62C9-E592-C706C613F5CF}"/>
+                </a:ext>
+              </a:extLst>
+            </p:cNvPr>
+            <p:cNvSpPr txBox="1"/>
+            <p:nvPr/>
+          </p:nvSpPr>
+          <p:spPr>
+            <a:xfrm>
+              <a:off x="5276850" y="1707657"/>
+              <a:ext cx="552450" cy="523220"/>
+            </a:xfrm>
+            <a:prstGeom prst="rect">
+              <a:avLst/>
+            </a:prstGeom>
+            <a:solidFill>
+              <a:schemeClr val="bg1"/>
+            </a:solidFill>
+          </p:spPr>
+          <p:txBody>
+            <a:bodyPr wrap="square" rtlCol="0">
+              <a:spAutoFit/>
+            </a:bodyPr>
+            <a:lstStyle/>
+            <a:p>
+              <a:r>
+                <a:rPr lang="en-US" sz="2800" b="1" dirty="0">
+                  <a:latin typeface="Times New Roman" panose="02020603050405020304" pitchFamily="18" charset="0"/>
+                  <a:cs typeface="Times New Roman" panose="02020603050405020304" pitchFamily="18" charset="0"/>
+                </a:rPr>
+                <a:t>I</a:t>
+              </a:r>
+              <a:r>
+                <a:rPr lang="en-US" sz="2800" b="1" baseline="-25000" dirty="0">
+                  <a:latin typeface="Times New Roman" panose="02020603050405020304" pitchFamily="18" charset="0"/>
+                  <a:cs typeface="Times New Roman" panose="02020603050405020304" pitchFamily="18" charset="0"/>
+                </a:rPr>
+                <a:t>1</a:t>
+              </a:r>
+              <a:endParaRPr lang="en-SG" sz="2800" b="1" baseline="-25000" dirty="0">
+                <a:latin typeface="Times New Roman" panose="02020603050405020304" pitchFamily="18" charset="0"/>
+                <a:cs typeface="Times New Roman" panose="02020603050405020304" pitchFamily="18" charset="0"/>
+              </a:endParaRPr>
+            </a:p>
+          </p:txBody>
+        </p:sp>
+        <p:sp>
+          <p:nvSpPr>
+            <p:cNvPr id="35" name="TextBox 34">
+              <a:extLst>
+                <a:ext uri="{FF2B5EF4-FFF2-40B4-BE49-F238E27FC236}">
+                  <a16:creationId xmlns:a16="http://schemas.microsoft.com/office/drawing/2014/main" id="{04B9A731-1982-6B73-20D8-CABD593476FC}"/>
+                </a:ext>
+              </a:extLst>
+            </p:cNvPr>
+            <p:cNvSpPr txBox="1"/>
+            <p:nvPr/>
+          </p:nvSpPr>
+          <p:spPr>
+            <a:xfrm>
+              <a:off x="5276850" y="2388601"/>
+              <a:ext cx="552450" cy="523220"/>
+            </a:xfrm>
+            <a:prstGeom prst="rect">
+              <a:avLst/>
+            </a:prstGeom>
+            <a:solidFill>
+              <a:schemeClr val="bg1"/>
+            </a:solidFill>
+          </p:spPr>
+          <p:txBody>
+            <a:bodyPr wrap="square" rtlCol="0">
+              <a:spAutoFit/>
+            </a:bodyPr>
+            <a:lstStyle/>
+            <a:p>
+              <a:r>
+                <a:rPr lang="en-US" sz="2800" b="1" dirty="0">
+                  <a:latin typeface="Times New Roman" panose="02020603050405020304" pitchFamily="18" charset="0"/>
+                  <a:cs typeface="Times New Roman" panose="02020603050405020304" pitchFamily="18" charset="0"/>
+                </a:rPr>
+                <a:t>I</a:t>
+              </a:r>
+              <a:r>
+                <a:rPr lang="en-US" sz="2800" b="1" baseline="-25000" dirty="0">
+                  <a:latin typeface="Times New Roman" panose="02020603050405020304" pitchFamily="18" charset="0"/>
+                  <a:cs typeface="Times New Roman" panose="02020603050405020304" pitchFamily="18" charset="0"/>
+                </a:rPr>
+                <a:t>2</a:t>
+              </a:r>
+              <a:endParaRPr lang="en-SG" sz="2800" b="1" baseline="-25000" dirty="0">
+                <a:latin typeface="Times New Roman" panose="02020603050405020304" pitchFamily="18" charset="0"/>
+                <a:cs typeface="Times New Roman" panose="02020603050405020304" pitchFamily="18" charset="0"/>
+              </a:endParaRPr>
+            </a:p>
+          </p:txBody>
+        </p:sp>
+        <p:sp>
+          <p:nvSpPr>
+            <p:cNvPr id="36" name="TextBox 35">
+              <a:extLst>
+                <a:ext uri="{FF2B5EF4-FFF2-40B4-BE49-F238E27FC236}">
+                  <a16:creationId xmlns:a16="http://schemas.microsoft.com/office/drawing/2014/main" id="{BA56C672-D532-61CA-1A3B-23B2905CE1B5}"/>
+                </a:ext>
+              </a:extLst>
+            </p:cNvPr>
+            <p:cNvSpPr txBox="1"/>
+            <p:nvPr/>
+          </p:nvSpPr>
+          <p:spPr>
+            <a:xfrm>
+              <a:off x="5276850" y="3079427"/>
+              <a:ext cx="552450" cy="523220"/>
+            </a:xfrm>
+            <a:prstGeom prst="rect">
+              <a:avLst/>
+            </a:prstGeom>
+            <a:solidFill>
+              <a:schemeClr val="bg1"/>
+            </a:solidFill>
+          </p:spPr>
+          <p:txBody>
+            <a:bodyPr wrap="square" rtlCol="0">
+              <a:spAutoFit/>
+            </a:bodyPr>
+            <a:lstStyle/>
+            <a:p>
+              <a:r>
+                <a:rPr lang="en-US" sz="2800" b="1" dirty="0">
+                  <a:latin typeface="Times New Roman" panose="02020603050405020304" pitchFamily="18" charset="0"/>
+                  <a:cs typeface="Times New Roman" panose="02020603050405020304" pitchFamily="18" charset="0"/>
+                </a:rPr>
+                <a:t>I</a:t>
+              </a:r>
+              <a:r>
+                <a:rPr lang="en-US" sz="2800" b="1" baseline="-25000" dirty="0">
+                  <a:latin typeface="Times New Roman" panose="02020603050405020304" pitchFamily="18" charset="0"/>
+                  <a:cs typeface="Times New Roman" panose="02020603050405020304" pitchFamily="18" charset="0"/>
+                </a:rPr>
+                <a:t>3</a:t>
+              </a:r>
+              <a:endParaRPr lang="en-SG" sz="2800" b="1" baseline="-25000" dirty="0">
+                <a:latin typeface="Times New Roman" panose="02020603050405020304" pitchFamily="18" charset="0"/>
+                <a:cs typeface="Times New Roman" panose="02020603050405020304" pitchFamily="18" charset="0"/>
+              </a:endParaRPr>
+            </a:p>
+          </p:txBody>
+        </p:sp>
+      </p:grpSp>
+    </p:spTree>
+    <p:extLst>
+      <p:ext uri="{BB962C8B-B14F-4D97-AF65-F5344CB8AC3E}">
+        <p14:creationId xmlns:p14="http://schemas.microsoft.com/office/powerpoint/2010/main" val="1584397997"/>
+      </p:ext>
+    </p:extLst>
+  </p:cSld>
+  <p:clrMapOvr>
+    <a:masterClrMapping/>
+  </p:clrMapOvr>
+</p:sld>
+</file>
+
+<file path=ppt/slides/slide4.xml><?xml version="1.0" encoding="utf-8"?>
+<p:sld xmlns:a="http://schemas.openxmlformats.org/drawingml/2006/main" xmlns:r="http://schemas.openxmlformats.org/officeDocument/2006/relationships" xmlns:p="http://schemas.openxmlformats.org/presentationml/2006/main">
+  <p:cSld>
+    <p:spTree>
+      <p:nvGrpSpPr>
         <p:cNvPr id="1" name=""/>
         <p:cNvGrpSpPr/>
         <p:nvPr/>
@@ -4868,7 +5296,7 @@
 </p:sld>
 </file>
 
-<file path=ppt/slides/slide4.xml><?xml version="1.0" encoding="utf-8"?>
+<file path=ppt/slides/slide5.xml><?xml version="1.0" encoding="utf-8"?>
 <p:sld xmlns:a="http://schemas.openxmlformats.org/drawingml/2006/main" xmlns:r="http://schemas.openxmlformats.org/officeDocument/2006/relationships" xmlns:p="http://schemas.openxmlformats.org/presentationml/2006/main">
   <p:cSld>
     <p:spTree>

</xml_diff>

<commit_message>
2nd algo + solutions toggle
</commit_message>
<xml_diff>
--- a/media/MUX.pptx
+++ b/media/MUX.pptx
@@ -6,10 +6,11 @@
   </p:sldMasterIdLst>
   <p:sldIdLst>
     <p:sldId id="256" r:id="rId2"/>
-    <p:sldId id="258" r:id="rId3"/>
-    <p:sldId id="260" r:id="rId4"/>
-    <p:sldId id="259" r:id="rId5"/>
-    <p:sldId id="257" r:id="rId6"/>
+    <p:sldId id="261" r:id="rId3"/>
+    <p:sldId id="258" r:id="rId4"/>
+    <p:sldId id="260" r:id="rId5"/>
+    <p:sldId id="259" r:id="rId6"/>
+    <p:sldId id="257" r:id="rId7"/>
   </p:sldIdLst>
   <p:sldSz cx="12192000" cy="6858000"/>
   <p:notesSz cx="6858000" cy="9144000"/>
@@ -265,7 +266,7 @@
           <a:p>
             <a:fld id="{480B0891-7744-4FB6-A46C-A0659091833E}" type="datetimeFigureOut">
               <a:rPr lang="en-SG" smtClean="0"/>
-              <a:t>23/12/2024</a:t>
+              <a:t>30/12/2024</a:t>
             </a:fld>
             <a:endParaRPr lang="en-SG"/>
           </a:p>
@@ -465,7 +466,7 @@
           <a:p>
             <a:fld id="{480B0891-7744-4FB6-A46C-A0659091833E}" type="datetimeFigureOut">
               <a:rPr lang="en-SG" smtClean="0"/>
-              <a:t>23/12/2024</a:t>
+              <a:t>30/12/2024</a:t>
             </a:fld>
             <a:endParaRPr lang="en-SG"/>
           </a:p>
@@ -675,7 +676,7 @@
           <a:p>
             <a:fld id="{480B0891-7744-4FB6-A46C-A0659091833E}" type="datetimeFigureOut">
               <a:rPr lang="en-SG" smtClean="0"/>
-              <a:t>23/12/2024</a:t>
+              <a:t>30/12/2024</a:t>
             </a:fld>
             <a:endParaRPr lang="en-SG"/>
           </a:p>
@@ -875,7 +876,7 @@
           <a:p>
             <a:fld id="{480B0891-7744-4FB6-A46C-A0659091833E}" type="datetimeFigureOut">
               <a:rPr lang="en-SG" smtClean="0"/>
-              <a:t>23/12/2024</a:t>
+              <a:t>30/12/2024</a:t>
             </a:fld>
             <a:endParaRPr lang="en-SG"/>
           </a:p>
@@ -1151,7 +1152,7 @@
           <a:p>
             <a:fld id="{480B0891-7744-4FB6-A46C-A0659091833E}" type="datetimeFigureOut">
               <a:rPr lang="en-SG" smtClean="0"/>
-              <a:t>23/12/2024</a:t>
+              <a:t>30/12/2024</a:t>
             </a:fld>
             <a:endParaRPr lang="en-SG"/>
           </a:p>
@@ -1419,7 +1420,7 @@
           <a:p>
             <a:fld id="{480B0891-7744-4FB6-A46C-A0659091833E}" type="datetimeFigureOut">
               <a:rPr lang="en-SG" smtClean="0"/>
-              <a:t>23/12/2024</a:t>
+              <a:t>30/12/2024</a:t>
             </a:fld>
             <a:endParaRPr lang="en-SG"/>
           </a:p>
@@ -1834,7 +1835,7 @@
           <a:p>
             <a:fld id="{480B0891-7744-4FB6-A46C-A0659091833E}" type="datetimeFigureOut">
               <a:rPr lang="en-SG" smtClean="0"/>
-              <a:t>23/12/2024</a:t>
+              <a:t>30/12/2024</a:t>
             </a:fld>
             <a:endParaRPr lang="en-SG"/>
           </a:p>
@@ -1976,7 +1977,7 @@
           <a:p>
             <a:fld id="{480B0891-7744-4FB6-A46C-A0659091833E}" type="datetimeFigureOut">
               <a:rPr lang="en-SG" smtClean="0"/>
-              <a:t>23/12/2024</a:t>
+              <a:t>30/12/2024</a:t>
             </a:fld>
             <a:endParaRPr lang="en-SG"/>
           </a:p>
@@ -2089,7 +2090,7 @@
           <a:p>
             <a:fld id="{480B0891-7744-4FB6-A46C-A0659091833E}" type="datetimeFigureOut">
               <a:rPr lang="en-SG" smtClean="0"/>
-              <a:t>23/12/2024</a:t>
+              <a:t>30/12/2024</a:t>
             </a:fld>
             <a:endParaRPr lang="en-SG"/>
           </a:p>
@@ -2402,7 +2403,7 @@
           <a:p>
             <a:fld id="{480B0891-7744-4FB6-A46C-A0659091833E}" type="datetimeFigureOut">
               <a:rPr lang="en-SG" smtClean="0"/>
-              <a:t>23/12/2024</a:t>
+              <a:t>30/12/2024</a:t>
             </a:fld>
             <a:endParaRPr lang="en-SG"/>
           </a:p>
@@ -2691,7 +2692,7 @@
           <a:p>
             <a:fld id="{480B0891-7744-4FB6-A46C-A0659091833E}" type="datetimeFigureOut">
               <a:rPr lang="en-SG" smtClean="0"/>
-              <a:t>23/12/2024</a:t>
+              <a:t>30/12/2024</a:t>
             </a:fld>
             <a:endParaRPr lang="en-SG"/>
           </a:p>
@@ -2934,7 +2935,7 @@
           <a:p>
             <a:fld id="{480B0891-7744-4FB6-A46C-A0659091833E}" type="datetimeFigureOut">
               <a:rPr lang="en-SG" smtClean="0"/>
-              <a:t>23/12/2024</a:t>
+              <a:t>30/12/2024</a:t>
             </a:fld>
             <a:endParaRPr lang="en-SG"/>
           </a:p>
@@ -3822,6 +3823,243 @@
 </file>
 
 <file path=ppt/slides/slide2.xml><?xml version="1.0" encoding="utf-8"?>
+<p:sld xmlns:a="http://schemas.openxmlformats.org/drawingml/2006/main" xmlns:r="http://schemas.openxmlformats.org/officeDocument/2006/relationships" xmlns:p="http://schemas.openxmlformats.org/presentationml/2006/main">
+  <p:cSld>
+    <p:spTree>
+      <p:nvGrpSpPr>
+        <p:cNvPr id="1" name="">
+          <a:extLst>
+            <a:ext uri="{FF2B5EF4-FFF2-40B4-BE49-F238E27FC236}">
+              <a16:creationId xmlns:a16="http://schemas.microsoft.com/office/drawing/2014/main" id="{6C5492E5-318A-CD7A-AC55-F48671061617}"/>
+            </a:ext>
+          </a:extLst>
+        </p:cNvPr>
+        <p:cNvGrpSpPr/>
+        <p:nvPr/>
+      </p:nvGrpSpPr>
+      <p:grpSpPr>
+        <a:xfrm>
+          <a:off x="0" y="0"/>
+          <a:ext cx="0" cy="0"/>
+          <a:chOff x="0" y="0"/>
+          <a:chExt cx="0" cy="0"/>
+        </a:xfrm>
+      </p:grpSpPr>
+      <p:sp>
+        <p:nvSpPr>
+          <p:cNvPr id="3" name="Rectangle 2">
+            <a:extLst>
+              <a:ext uri="{FF2B5EF4-FFF2-40B4-BE49-F238E27FC236}">
+                <a16:creationId xmlns:a16="http://schemas.microsoft.com/office/drawing/2014/main" id="{51FE170F-831F-63C5-7FA7-533999BDCBEF}"/>
+              </a:ext>
+            </a:extLst>
+          </p:cNvPr>
+          <p:cNvSpPr/>
+          <p:nvPr/>
+        </p:nvSpPr>
+        <p:spPr>
+          <a:xfrm>
+            <a:off x="1323975" y="276225"/>
+            <a:ext cx="9934575" cy="6248400"/>
+          </a:xfrm>
+          <a:prstGeom prst="rect">
+            <a:avLst/>
+          </a:prstGeom>
+        </p:spPr>
+        <p:style>
+          <a:lnRef idx="2">
+            <a:schemeClr val="accent1">
+              <a:shade val="15000"/>
+            </a:schemeClr>
+          </a:lnRef>
+          <a:fillRef idx="1">
+            <a:schemeClr val="accent1"/>
+          </a:fillRef>
+          <a:effectRef idx="0">
+            <a:schemeClr val="accent1"/>
+          </a:effectRef>
+          <a:fontRef idx="minor">
+            <a:schemeClr val="lt1"/>
+          </a:fontRef>
+        </p:style>
+        <p:txBody>
+          <a:bodyPr rtlCol="0" anchor="ctr"/>
+          <a:lstStyle/>
+          <a:p>
+            <a:pPr algn="ctr"/>
+            <a:endParaRPr lang="en-SG"/>
+          </a:p>
+        </p:txBody>
+      </p:sp>
+      <p:grpSp>
+        <p:nvGrpSpPr>
+          <p:cNvPr id="12" name="Group 11">
+            <a:extLst>
+              <a:ext uri="{FF2B5EF4-FFF2-40B4-BE49-F238E27FC236}">
+                <a16:creationId xmlns:a16="http://schemas.microsoft.com/office/drawing/2014/main" id="{C08EBD7E-2D78-F3AD-ABFA-99BEF3BB4286}"/>
+              </a:ext>
+            </a:extLst>
+          </p:cNvPr>
+          <p:cNvGrpSpPr/>
+          <p:nvPr/>
+        </p:nvGrpSpPr>
+        <p:grpSpPr>
+          <a:xfrm>
+            <a:off x="3396000" y="542924"/>
+            <a:ext cx="5400000" cy="5400000"/>
+            <a:chOff x="3396000" y="542924"/>
+            <a:chExt cx="5400000" cy="5400000"/>
+          </a:xfrm>
+        </p:grpSpPr>
+        <p:sp>
+          <p:nvSpPr>
+            <p:cNvPr id="4" name="Rectangle: Rounded Corners 3">
+              <a:extLst>
+                <a:ext uri="{FF2B5EF4-FFF2-40B4-BE49-F238E27FC236}">
+                  <a16:creationId xmlns:a16="http://schemas.microsoft.com/office/drawing/2014/main" id="{7A666922-906C-BCBA-6AD5-CC42AD2FB391}"/>
+                </a:ext>
+              </a:extLst>
+            </p:cNvPr>
+            <p:cNvSpPr/>
+            <p:nvPr/>
+          </p:nvSpPr>
+          <p:spPr>
+            <a:xfrm>
+              <a:off x="3396000" y="542924"/>
+              <a:ext cx="5400000" cy="5400000"/>
+            </a:xfrm>
+            <a:prstGeom prst="roundRect">
+              <a:avLst/>
+            </a:prstGeom>
+            <a:solidFill>
+              <a:schemeClr val="tx1"/>
+            </a:solidFill>
+            <a:ln w="12700">
+              <a:solidFill>
+                <a:schemeClr val="tx1"/>
+              </a:solidFill>
+            </a:ln>
+          </p:spPr>
+          <p:style>
+            <a:lnRef idx="2">
+              <a:schemeClr val="accent1">
+                <a:shade val="15000"/>
+              </a:schemeClr>
+            </a:lnRef>
+            <a:fillRef idx="1">
+              <a:schemeClr val="accent1"/>
+            </a:fillRef>
+            <a:effectRef idx="0">
+              <a:schemeClr val="accent1"/>
+            </a:effectRef>
+            <a:fontRef idx="minor">
+              <a:schemeClr val="lt1"/>
+            </a:fontRef>
+          </p:style>
+          <p:txBody>
+            <a:bodyPr rtlCol="0" anchor="ctr"/>
+            <a:lstStyle/>
+            <a:p>
+              <a:pPr algn="ctr"/>
+              <a:endParaRPr lang="en-SG"/>
+            </a:p>
+          </p:txBody>
+        </p:sp>
+        <p:sp>
+          <p:nvSpPr>
+            <p:cNvPr id="10" name="Rectangle: Rounded Corners 9">
+              <a:extLst>
+                <a:ext uri="{FF2B5EF4-FFF2-40B4-BE49-F238E27FC236}">
+                  <a16:creationId xmlns:a16="http://schemas.microsoft.com/office/drawing/2014/main" id="{777CB6EA-DE1C-96B1-8C6F-F79133ED9C1C}"/>
+                </a:ext>
+              </a:extLst>
+            </p:cNvPr>
+            <p:cNvSpPr/>
+            <p:nvPr/>
+          </p:nvSpPr>
+          <p:spPr>
+            <a:xfrm rot="1041364">
+              <a:off x="5907541" y="4192347"/>
+              <a:ext cx="1657514" cy="656078"/>
+            </a:xfrm>
+            <a:prstGeom prst="roundRect">
+              <a:avLst>
+                <a:gd name="adj" fmla="val 21297"/>
+              </a:avLst>
+            </a:prstGeom>
+            <a:solidFill>
+              <a:schemeClr val="bg1"/>
+            </a:solidFill>
+          </p:spPr>
+          <p:style>
+            <a:lnRef idx="2">
+              <a:schemeClr val="accent1">
+                <a:shade val="15000"/>
+              </a:schemeClr>
+            </a:lnRef>
+            <a:fillRef idx="1">
+              <a:schemeClr val="accent1"/>
+            </a:fillRef>
+            <a:effectRef idx="0">
+              <a:schemeClr val="accent1"/>
+            </a:effectRef>
+            <a:fontRef idx="minor">
+              <a:schemeClr val="lt1"/>
+            </a:fontRef>
+          </p:style>
+          <p:txBody>
+            <a:bodyPr rtlCol="0" anchor="ctr"/>
+            <a:lstStyle/>
+            <a:p>
+              <a:pPr algn="ctr"/>
+              <a:endParaRPr lang="en-SG"/>
+            </a:p>
+          </p:txBody>
+        </p:sp>
+        <p:pic>
+          <p:nvPicPr>
+            <p:cNvPr id="5" name="Picture 4">
+              <a:extLst>
+                <a:ext uri="{FF2B5EF4-FFF2-40B4-BE49-F238E27FC236}">
+                  <a16:creationId xmlns:a16="http://schemas.microsoft.com/office/drawing/2014/main" id="{793FF9E1-8055-75A0-63FF-E93033BF2429}"/>
+                </a:ext>
+              </a:extLst>
+            </p:cNvPr>
+            <p:cNvPicPr>
+              <a:picLocks noChangeAspect="1"/>
+            </p:cNvPicPr>
+            <p:nvPr/>
+          </p:nvPicPr>
+          <p:blipFill>
+            <a:blip r:embed="rId2"/>
+            <a:srcRect l="3207" t="1" r="56362" b="4717"/>
+            <a:stretch/>
+          </p:blipFill>
+          <p:spPr>
+            <a:xfrm rot="39525">
+              <a:off x="4176859" y="1267784"/>
+              <a:ext cx="4036824" cy="3229502"/>
+            </a:xfrm>
+            <a:prstGeom prst="rect">
+              <a:avLst/>
+            </a:prstGeom>
+          </p:spPr>
+        </p:pic>
+      </p:grpSp>
+    </p:spTree>
+    <p:extLst>
+      <p:ext uri="{BB962C8B-B14F-4D97-AF65-F5344CB8AC3E}">
+        <p14:creationId xmlns:p14="http://schemas.microsoft.com/office/powerpoint/2010/main" val="1132146839"/>
+      </p:ext>
+    </p:extLst>
+  </p:cSld>
+  <p:clrMapOvr>
+    <a:masterClrMapping/>
+  </p:clrMapOvr>
+</p:sld>
+</file>
+
+<file path=ppt/slides/slide3.xml><?xml version="1.0" encoding="utf-8"?>
 <p:sld xmlns:a="http://schemas.openxmlformats.org/drawingml/2006/main" xmlns:r="http://schemas.openxmlformats.org/officeDocument/2006/relationships" xmlns:p="http://schemas.openxmlformats.org/presentationml/2006/main">
   <p:cSld>
     <p:spTree>
@@ -4702,7 +4940,7 @@
 </p:sld>
 </file>
 
-<file path=ppt/slides/slide3.xml><?xml version="1.0" encoding="utf-8"?>
+<file path=ppt/slides/slide4.xml><?xml version="1.0" encoding="utf-8"?>
 <p:sld xmlns:a="http://schemas.openxmlformats.org/drawingml/2006/main" xmlns:r="http://schemas.openxmlformats.org/officeDocument/2006/relationships" xmlns:p="http://schemas.openxmlformats.org/presentationml/2006/main">
   <p:cSld>
     <p:spTree>
@@ -5129,7 +5367,7 @@
 </p:sld>
 </file>
 
-<file path=ppt/slides/slide4.xml><?xml version="1.0" encoding="utf-8"?>
+<file path=ppt/slides/slide5.xml><?xml version="1.0" encoding="utf-8"?>
 <p:sld xmlns:a="http://schemas.openxmlformats.org/drawingml/2006/main" xmlns:r="http://schemas.openxmlformats.org/officeDocument/2006/relationships" xmlns:p="http://schemas.openxmlformats.org/presentationml/2006/main">
   <p:cSld>
     <p:spTree>
@@ -5296,7 +5534,7 @@
 </p:sld>
 </file>
 
-<file path=ppt/slides/slide5.xml><?xml version="1.0" encoding="utf-8"?>
+<file path=ppt/slides/slide6.xml><?xml version="1.0" encoding="utf-8"?>
 <p:sld xmlns:a="http://schemas.openxmlformats.org/drawingml/2006/main" xmlns:r="http://schemas.openxmlformats.org/officeDocument/2006/relationships" xmlns:p="http://schemas.openxmlformats.org/presentationml/2006/main">
   <p:cSld>
     <p:spTree>

</xml_diff>

<commit_message>
tidy up the table
</commit_message>
<xml_diff>
--- a/media/MUX.pptx
+++ b/media/MUX.pptx
@@ -11,6 +11,8 @@
     <p:sldId id="260" r:id="rId5"/>
     <p:sldId id="259" r:id="rId6"/>
     <p:sldId id="257" r:id="rId7"/>
+    <p:sldId id="262" r:id="rId8"/>
+    <p:sldId id="263" r:id="rId9"/>
   </p:sldIdLst>
   <p:sldSz cx="12192000" cy="6858000"/>
   <p:notesSz cx="6858000" cy="9144000"/>
@@ -266,7 +268,7 @@
           <a:p>
             <a:fld id="{480B0891-7744-4FB6-A46C-A0659091833E}" type="datetimeFigureOut">
               <a:rPr lang="en-SG" smtClean="0"/>
-              <a:t>30/12/2024</a:t>
+              <a:t>1/1/2025</a:t>
             </a:fld>
             <a:endParaRPr lang="en-SG"/>
           </a:p>
@@ -466,7 +468,7 @@
           <a:p>
             <a:fld id="{480B0891-7744-4FB6-A46C-A0659091833E}" type="datetimeFigureOut">
               <a:rPr lang="en-SG" smtClean="0"/>
-              <a:t>30/12/2024</a:t>
+              <a:t>1/1/2025</a:t>
             </a:fld>
             <a:endParaRPr lang="en-SG"/>
           </a:p>
@@ -676,7 +678,7 @@
           <a:p>
             <a:fld id="{480B0891-7744-4FB6-A46C-A0659091833E}" type="datetimeFigureOut">
               <a:rPr lang="en-SG" smtClean="0"/>
-              <a:t>30/12/2024</a:t>
+              <a:t>1/1/2025</a:t>
             </a:fld>
             <a:endParaRPr lang="en-SG"/>
           </a:p>
@@ -876,7 +878,7 @@
           <a:p>
             <a:fld id="{480B0891-7744-4FB6-A46C-A0659091833E}" type="datetimeFigureOut">
               <a:rPr lang="en-SG" smtClean="0"/>
-              <a:t>30/12/2024</a:t>
+              <a:t>1/1/2025</a:t>
             </a:fld>
             <a:endParaRPr lang="en-SG"/>
           </a:p>
@@ -1152,7 +1154,7 @@
           <a:p>
             <a:fld id="{480B0891-7744-4FB6-A46C-A0659091833E}" type="datetimeFigureOut">
               <a:rPr lang="en-SG" smtClean="0"/>
-              <a:t>30/12/2024</a:t>
+              <a:t>1/1/2025</a:t>
             </a:fld>
             <a:endParaRPr lang="en-SG"/>
           </a:p>
@@ -1420,7 +1422,7 @@
           <a:p>
             <a:fld id="{480B0891-7744-4FB6-A46C-A0659091833E}" type="datetimeFigureOut">
               <a:rPr lang="en-SG" smtClean="0"/>
-              <a:t>30/12/2024</a:t>
+              <a:t>1/1/2025</a:t>
             </a:fld>
             <a:endParaRPr lang="en-SG"/>
           </a:p>
@@ -1835,7 +1837,7 @@
           <a:p>
             <a:fld id="{480B0891-7744-4FB6-A46C-A0659091833E}" type="datetimeFigureOut">
               <a:rPr lang="en-SG" smtClean="0"/>
-              <a:t>30/12/2024</a:t>
+              <a:t>1/1/2025</a:t>
             </a:fld>
             <a:endParaRPr lang="en-SG"/>
           </a:p>
@@ -1977,7 +1979,7 @@
           <a:p>
             <a:fld id="{480B0891-7744-4FB6-A46C-A0659091833E}" type="datetimeFigureOut">
               <a:rPr lang="en-SG" smtClean="0"/>
-              <a:t>30/12/2024</a:t>
+              <a:t>1/1/2025</a:t>
             </a:fld>
             <a:endParaRPr lang="en-SG"/>
           </a:p>
@@ -2090,7 +2092,7 @@
           <a:p>
             <a:fld id="{480B0891-7744-4FB6-A46C-A0659091833E}" type="datetimeFigureOut">
               <a:rPr lang="en-SG" smtClean="0"/>
-              <a:t>30/12/2024</a:t>
+              <a:t>1/1/2025</a:t>
             </a:fld>
             <a:endParaRPr lang="en-SG"/>
           </a:p>
@@ -2403,7 +2405,7 @@
           <a:p>
             <a:fld id="{480B0891-7744-4FB6-A46C-A0659091833E}" type="datetimeFigureOut">
               <a:rPr lang="en-SG" smtClean="0"/>
-              <a:t>30/12/2024</a:t>
+              <a:t>1/1/2025</a:t>
             </a:fld>
             <a:endParaRPr lang="en-SG"/>
           </a:p>
@@ -2692,7 +2694,7 @@
           <a:p>
             <a:fld id="{480B0891-7744-4FB6-A46C-A0659091833E}" type="datetimeFigureOut">
               <a:rPr lang="en-SG" smtClean="0"/>
-              <a:t>30/12/2024</a:t>
+              <a:t>1/1/2025</a:t>
             </a:fld>
             <a:endParaRPr lang="en-SG"/>
           </a:p>
@@ -2935,7 +2937,7 @@
           <a:p>
             <a:fld id="{480B0891-7744-4FB6-A46C-A0659091833E}" type="datetimeFigureOut">
               <a:rPr lang="en-SG" smtClean="0"/>
-              <a:t>30/12/2024</a:t>
+              <a:t>1/1/2025</a:t>
             </a:fld>
             <a:endParaRPr lang="en-SG"/>
           </a:p>
@@ -5623,6 +5625,125 @@
 </p:sld>
 </file>
 
+<file path=ppt/slides/slide7.xml><?xml version="1.0" encoding="utf-8"?>
+<p:sld xmlns:a="http://schemas.openxmlformats.org/drawingml/2006/main" xmlns:r="http://schemas.openxmlformats.org/officeDocument/2006/relationships" xmlns:p="http://schemas.openxmlformats.org/presentationml/2006/main">
+  <p:cSld>
+    <p:spTree>
+      <p:nvGrpSpPr>
+        <p:cNvPr id="1" name=""/>
+        <p:cNvGrpSpPr/>
+        <p:nvPr/>
+      </p:nvGrpSpPr>
+      <p:grpSpPr>
+        <a:xfrm>
+          <a:off x="0" y="0"/>
+          <a:ext cx="0" cy="0"/>
+          <a:chOff x="0" y="0"/>
+          <a:chExt cx="0" cy="0"/>
+        </a:xfrm>
+      </p:grpSpPr>
+      <p:pic>
+        <p:nvPicPr>
+          <p:cNvPr id="3" name="Picture 2">
+            <a:extLst>
+              <a:ext uri="{FF2B5EF4-FFF2-40B4-BE49-F238E27FC236}">
+                <a16:creationId xmlns:a16="http://schemas.microsoft.com/office/drawing/2014/main" id="{38BA3280-34F2-052B-E374-A0A31B3C076E}"/>
+              </a:ext>
+            </a:extLst>
+          </p:cNvPr>
+          <p:cNvPicPr>
+            <a:picLocks noChangeAspect="1"/>
+          </p:cNvPicPr>
+          <p:nvPr/>
+        </p:nvPicPr>
+        <p:blipFill>
+          <a:blip r:embed="rId2"/>
+          <a:srcRect t="3341"/>
+          <a:stretch/>
+        </p:blipFill>
+        <p:spPr>
+          <a:xfrm>
+            <a:off x="0" y="353085"/>
+            <a:ext cx="12192000" cy="6372082"/>
+          </a:xfrm>
+          <a:prstGeom prst="rect">
+            <a:avLst/>
+          </a:prstGeom>
+        </p:spPr>
+      </p:pic>
+    </p:spTree>
+    <p:extLst>
+      <p:ext uri="{BB962C8B-B14F-4D97-AF65-F5344CB8AC3E}">
+        <p14:creationId xmlns:p14="http://schemas.microsoft.com/office/powerpoint/2010/main" val="2977509527"/>
+      </p:ext>
+    </p:extLst>
+  </p:cSld>
+  <p:clrMapOvr>
+    <a:masterClrMapping/>
+  </p:clrMapOvr>
+</p:sld>
+</file>
+
+<file path=ppt/slides/slide8.xml><?xml version="1.0" encoding="utf-8"?>
+<p:sld xmlns:a="http://schemas.openxmlformats.org/drawingml/2006/main" xmlns:r="http://schemas.openxmlformats.org/officeDocument/2006/relationships" xmlns:p="http://schemas.openxmlformats.org/presentationml/2006/main">
+  <p:cSld>
+    <p:spTree>
+      <p:nvGrpSpPr>
+        <p:cNvPr id="1" name=""/>
+        <p:cNvGrpSpPr/>
+        <p:nvPr/>
+      </p:nvGrpSpPr>
+      <p:grpSpPr>
+        <a:xfrm>
+          <a:off x="0" y="0"/>
+          <a:ext cx="0" cy="0"/>
+          <a:chOff x="0" y="0"/>
+          <a:chExt cx="0" cy="0"/>
+        </a:xfrm>
+      </p:grpSpPr>
+      <p:pic>
+        <p:nvPicPr>
+          <p:cNvPr id="3" name="Picture 2">
+            <a:extLst>
+              <a:ext uri="{FF2B5EF4-FFF2-40B4-BE49-F238E27FC236}">
+                <a16:creationId xmlns:a16="http://schemas.microsoft.com/office/drawing/2014/main" id="{CC98841C-F825-6AF6-247F-B4648BE1F3B3}"/>
+              </a:ext>
+            </a:extLst>
+          </p:cNvPr>
+          <p:cNvPicPr>
+            <a:picLocks noChangeAspect="1"/>
+          </p:cNvPicPr>
+          <p:nvPr/>
+        </p:nvPicPr>
+        <p:blipFill>
+          <a:blip r:embed="rId2"/>
+          <a:stretch>
+            <a:fillRect/>
+          </a:stretch>
+        </p:blipFill>
+        <p:spPr>
+          <a:xfrm>
+            <a:off x="2566495" y="847364"/>
+            <a:ext cx="7059010" cy="5163271"/>
+          </a:xfrm>
+          <a:prstGeom prst="rect">
+            <a:avLst/>
+          </a:prstGeom>
+        </p:spPr>
+      </p:pic>
+    </p:spTree>
+    <p:extLst>
+      <p:ext uri="{BB962C8B-B14F-4D97-AF65-F5344CB8AC3E}">
+        <p14:creationId xmlns:p14="http://schemas.microsoft.com/office/powerpoint/2010/main" val="3127547207"/>
+      </p:ext>
+    </p:extLst>
+  </p:cSld>
+  <p:clrMapOvr>
+    <a:masterClrMapping/>
+  </p:clrMapOvr>
+</p:sld>
+</file>
+
 <file path=ppt/theme/theme1.xml><?xml version="1.0" encoding="utf-8"?>
 <a:theme xmlns:a="http://schemas.openxmlformats.org/drawingml/2006/main" name="Office Theme">
   <a:themeElements>

</xml_diff>